<commit_message>
Some images, problem statement
</commit_message>
<xml_diff>
--- a/gennav-poster/BaDhGrICLR2018-poster.pptx
+++ b/gennav-poster/BaDhGrICLR2018-poster.pptx
@@ -1157,9 +1157,9 @@
         <p:grpSpPr>
           <a:xfrm>
             <a:off x="33103527" y="26968561"/>
-            <a:ext cx="10332720" cy="3423014"/>
+            <a:ext cx="10332720" cy="3115237"/>
             <a:chOff x="33261300" y="24619721"/>
-            <a:chExt cx="10287000" cy="3423014"/>
+            <a:chExt cx="10287000" cy="3115237"/>
           </a:xfrm>
         </p:grpSpPr>
         <p:sp>
@@ -1173,7 +1173,7 @@
           <p:spPr bwMode="auto">
             <a:xfrm>
               <a:off x="33261300" y="25303570"/>
-              <a:ext cx="10287000" cy="2739165"/>
+              <a:ext cx="10287000" cy="2431388"/>
             </a:xfrm>
             <a:prstGeom prst="rect">
               <a:avLst/>
@@ -1302,19 +1302,151 @@
                 <a:rPr lang="en-US" sz="2000" dirty="0">
                   <a:latin typeface="Calibri" pitchFamily="34" charset="0"/>
                 </a:rPr>
-                <a:t>[1]	Su et al. Render for CNN: </a:t>
-              </a:r>
-              <a:r>
-                <a:rPr lang="en-US" sz="2000" i="1" dirty="0">
+                <a:t>[1]	Piotr </a:t>
+              </a:r>
+              <a:r>
+                <a:rPr lang="en-US" sz="2000" dirty="0" err="1">
                   <a:latin typeface="Calibri" pitchFamily="34" charset="0"/>
                 </a:rPr>
-                <a:t>Viewpoint Estimation in Images Using CNNs Trained with Rendered 3D Model Views.</a:t>
+                <a:t>Mirowski</a:t>
               </a:r>
               <a:r>
                 <a:rPr lang="en-US" sz="2000" dirty="0">
                   <a:latin typeface="Calibri" pitchFamily="34" charset="0"/>
                 </a:rPr>
-                <a:t> ICCV 2015.</a:t>
+                <a:t>, Razvan </a:t>
+              </a:r>
+              <a:r>
+                <a:rPr lang="en-US" sz="2000" dirty="0" err="1">
+                  <a:latin typeface="Calibri" pitchFamily="34" charset="0"/>
+                </a:rPr>
+                <a:t>Pascanu</a:t>
+              </a:r>
+              <a:r>
+                <a:rPr lang="en-US" sz="2000" dirty="0">
+                  <a:latin typeface="Calibri" pitchFamily="34" charset="0"/>
+                </a:rPr>
+                <a:t>, Fabio Viola, Hubert </a:t>
+              </a:r>
+              <a:r>
+                <a:rPr lang="en-US" sz="2000" dirty="0" err="1">
+                  <a:latin typeface="Calibri" pitchFamily="34" charset="0"/>
+                </a:rPr>
+                <a:t>Soyer</a:t>
+              </a:r>
+              <a:r>
+                <a:rPr lang="en-US" sz="2000" dirty="0">
+                  <a:latin typeface="Calibri" pitchFamily="34" charset="0"/>
+                </a:rPr>
+                <a:t>, Andrew J. Ballard, Andrea </a:t>
+              </a:r>
+              <a:r>
+                <a:rPr lang="en-US" sz="2000" dirty="0" err="1">
+                  <a:latin typeface="Calibri" pitchFamily="34" charset="0"/>
+                </a:rPr>
+                <a:t>Banino</a:t>
+              </a:r>
+              <a:r>
+                <a:rPr lang="en-US" sz="2000" dirty="0">
+                  <a:latin typeface="Calibri" pitchFamily="34" charset="0"/>
+                </a:rPr>
+                <a:t>, Misha </a:t>
+              </a:r>
+              <a:r>
+                <a:rPr lang="en-US" sz="2000" dirty="0" err="1">
+                  <a:latin typeface="Calibri" pitchFamily="34" charset="0"/>
+                </a:rPr>
+                <a:t>Denil</a:t>
+              </a:r>
+              <a:r>
+                <a:rPr lang="en-US" sz="2000" dirty="0">
+                  <a:latin typeface="Calibri" pitchFamily="34" charset="0"/>
+                </a:rPr>
+                <a:t>, Ross </a:t>
+              </a:r>
+              <a:r>
+                <a:rPr lang="en-US" sz="2000" dirty="0" err="1">
+                  <a:latin typeface="Calibri" pitchFamily="34" charset="0"/>
+                </a:rPr>
+                <a:t>Goroshin</a:t>
+              </a:r>
+              <a:r>
+                <a:rPr lang="en-US" sz="2000" dirty="0">
+                  <a:latin typeface="Calibri" pitchFamily="34" charset="0"/>
+                </a:rPr>
+                <a:t>, Laurent </a:t>
+              </a:r>
+              <a:r>
+                <a:rPr lang="en-US" sz="2000" dirty="0" err="1">
+                  <a:latin typeface="Calibri" pitchFamily="34" charset="0"/>
+                </a:rPr>
+                <a:t>Sifre</a:t>
+              </a:r>
+              <a:r>
+                <a:rPr lang="en-US" sz="2000" dirty="0">
+                  <a:latin typeface="Calibri" pitchFamily="34" charset="0"/>
+                </a:rPr>
+                <a:t>, </a:t>
+              </a:r>
+              <a:r>
+                <a:rPr lang="en-US" sz="2000" dirty="0" err="1">
+                  <a:latin typeface="Calibri" pitchFamily="34" charset="0"/>
+                </a:rPr>
+                <a:t>Koray</a:t>
+              </a:r>
+              <a:r>
+                <a:rPr lang="en-US" sz="2000" dirty="0">
+                  <a:latin typeface="Calibri" pitchFamily="34" charset="0"/>
+                </a:rPr>
+                <a:t> </a:t>
+              </a:r>
+              <a:r>
+                <a:rPr lang="en-US" sz="2000" dirty="0" err="1">
+                  <a:latin typeface="Calibri" pitchFamily="34" charset="0"/>
+                </a:rPr>
+                <a:t>Kavukcuoglu</a:t>
+              </a:r>
+              <a:r>
+                <a:rPr lang="en-US" sz="2000" dirty="0">
+                  <a:latin typeface="Calibri" pitchFamily="34" charset="0"/>
+                </a:rPr>
+                <a:t>, </a:t>
+              </a:r>
+              <a:r>
+                <a:rPr lang="en-US" sz="2000" dirty="0" err="1">
+                  <a:latin typeface="Calibri" pitchFamily="34" charset="0"/>
+                </a:rPr>
+                <a:t>Dharshan</a:t>
+              </a:r>
+              <a:r>
+                <a:rPr lang="en-US" sz="2000" dirty="0">
+                  <a:latin typeface="Calibri" pitchFamily="34" charset="0"/>
+                </a:rPr>
+                <a:t> Kumaran, and </a:t>
+              </a:r>
+              <a:r>
+                <a:rPr lang="en-US" sz="2000" dirty="0" err="1">
+                  <a:latin typeface="Calibri" pitchFamily="34" charset="0"/>
+                </a:rPr>
+                <a:t>Raia</a:t>
+              </a:r>
+              <a:r>
+                <a:rPr lang="en-US" sz="2000" dirty="0">
+                  <a:latin typeface="Calibri" pitchFamily="34" charset="0"/>
+                </a:rPr>
+                <a:t> Hadsell. Learning to navigate in complex environments. </a:t>
+              </a:r>
+              <a:r>
+                <a:rPr lang="en-US" sz="2000" dirty="0" err="1">
+                  <a:latin typeface="Calibri" pitchFamily="34" charset="0"/>
+                </a:rPr>
+                <a:t>CoRR</a:t>
+              </a:r>
+              <a:r>
+                <a:rPr lang="en-US" sz="2000" dirty="0">
+                  <a:latin typeface="Calibri" pitchFamily="34" charset="0"/>
+                </a:rPr>
+                <a:t>, abs/1611.03673, 2016. URL http://arxiv.org/abs/1611.03673 </a:t>
               </a:r>
             </a:p>
             <a:p>
@@ -1327,124 +1459,91 @@
                 <a:rPr lang="en-US" sz="2000" dirty="0">
                   <a:latin typeface="Calibri" pitchFamily="34" charset="0"/>
                 </a:rPr>
-                <a:t>[2]	Chang et al. </a:t>
-              </a:r>
-              <a:r>
-                <a:rPr lang="en-US" sz="2000" i="1" dirty="0">
+                <a:t>[2]	Charles Beattie, Joel Z </a:t>
+              </a:r>
+              <a:r>
+                <a:rPr lang="en-US" sz="2000" dirty="0" err="1">
                   <a:latin typeface="Calibri" pitchFamily="34" charset="0"/>
                 </a:rPr>
-                <a:t>ShapeNet: An Information-Rich 3D Model Repository.</a:t>
+                <a:t>Leibo</a:t>
               </a:r>
               <a:r>
                 <a:rPr lang="en-US" sz="2000" dirty="0">
                   <a:latin typeface="Calibri" pitchFamily="34" charset="0"/>
                 </a:rPr>
-                <a:t> </a:t>
+                <a:t>, Denis </a:t>
               </a:r>
               <a:r>
                 <a:rPr lang="en-US" sz="2000" dirty="0" err="1">
                   <a:latin typeface="Calibri" pitchFamily="34" charset="0"/>
                 </a:rPr>
-                <a:t>ArXiv</a:t>
+                <a:t>Teplyashin</a:t>
               </a:r>
               <a:r>
                 <a:rPr lang="en-US" sz="2000" dirty="0">
                   <a:latin typeface="Calibri" pitchFamily="34" charset="0"/>
                 </a:rPr>
-                <a:t> 2015.</a:t>
-              </a:r>
-            </a:p>
-            <a:p>
-              <a:pPr marL="465138" indent="-465138" algn="just" eaLnBrk="1" hangingPunct="1">
-                <a:tabLst>
-                  <a:tab pos="465138" algn="l"/>
-                </a:tabLst>
-              </a:pPr>
+                <a:t>, Tom Ward, Marcus Wainwright, Heinrich </a:t>
+              </a:r>
+              <a:r>
+                <a:rPr lang="en-US" sz="2000" dirty="0" err="1">
+                  <a:latin typeface="Calibri" pitchFamily="34" charset="0"/>
+                </a:rPr>
+                <a:t>Küttler</a:t>
+              </a:r>
               <a:r>
                 <a:rPr lang="en-US" sz="2000" dirty="0">
                   <a:latin typeface="Calibri" pitchFamily="34" charset="0"/>
                 </a:rPr>
-                <a:t>[3]	Xiang et al. </a:t>
-              </a:r>
-              <a:r>
-                <a:rPr lang="en-US" sz="2000" i="1" dirty="0">
+                <a:t>, Andrew </a:t>
+              </a:r>
+              <a:r>
+                <a:rPr lang="en-US" sz="2000" dirty="0" err="1">
                   <a:latin typeface="Calibri" pitchFamily="34" charset="0"/>
                 </a:rPr>
-                <a:t>Beyond PASCAL: A Benchmark for 3D Object Detection in the Wild.</a:t>
+                <a:t>Lefrancq</a:t>
               </a:r>
               <a:r>
                 <a:rPr lang="en-US" sz="2000" dirty="0">
                   <a:latin typeface="Calibri" pitchFamily="34" charset="0"/>
                 </a:rPr>
-                <a:t> WACV 2014.</a:t>
-              </a:r>
-            </a:p>
-            <a:p>
-              <a:pPr marL="465138" indent="-465138" algn="just" eaLnBrk="1" hangingPunct="1">
-                <a:tabLst>
-                  <a:tab pos="465138" algn="l"/>
-                </a:tabLst>
-              </a:pPr>
+                <a:t>, Simon Green, Víctor Valdés, Amir </a:t>
+              </a:r>
+              <a:r>
+                <a:rPr lang="en-US" sz="2000" dirty="0" err="1">
+                  <a:latin typeface="Calibri" pitchFamily="34" charset="0"/>
+                </a:rPr>
+                <a:t>Sadik</a:t>
+              </a:r>
               <a:r>
                 <a:rPr lang="en-US" sz="2000" dirty="0">
                   <a:latin typeface="Calibri" pitchFamily="34" charset="0"/>
                 </a:rPr>
-                <a:t>[4]	Li et al. </a:t>
-              </a:r>
-              <a:r>
-                <a:rPr lang="en-US" sz="2000" i="1" dirty="0">
+                <a:t>, et al. </a:t>
+              </a:r>
+              <a:r>
+                <a:rPr lang="en-US" sz="2000" dirty="0" err="1">
                   <a:latin typeface="Calibri" pitchFamily="34" charset="0"/>
                 </a:rPr>
-                <a:t>Deep Supervision with Shape Concepts for Occlusion-Aware 3D Object Parsing.</a:t>
+                <a:t>Deepmind</a:t>
               </a:r>
               <a:r>
                 <a:rPr lang="en-US" sz="2000" dirty="0">
                   <a:latin typeface="Calibri" pitchFamily="34" charset="0"/>
                 </a:rPr>
-                <a:t> CVPR 2017.</a:t>
-              </a:r>
-            </a:p>
-            <a:p>
-              <a:pPr marL="465138" indent="-465138" algn="just" eaLnBrk="1" hangingPunct="1">
-                <a:tabLst>
-                  <a:tab pos="465138" algn="l"/>
-                </a:tabLst>
-              </a:pPr>
+                <a:t> lab. </a:t>
+              </a:r>
+              <a:r>
+                <a:rPr lang="en-US" sz="2000" dirty="0" err="1">
+                  <a:latin typeface="Calibri" pitchFamily="34" charset="0"/>
+                </a:rPr>
+                <a:t>arXiv</a:t>
+              </a:r>
               <a:r>
                 <a:rPr lang="en-US" sz="2000" dirty="0">
                   <a:latin typeface="Calibri" pitchFamily="34" charset="0"/>
                 </a:rPr>
-                <a:t>[5]	</a:t>
-              </a:r>
-              <a:r>
-                <a:rPr lang="en-US" sz="2000" dirty="0" err="1">
-                  <a:latin typeface="Calibri" pitchFamily="34" charset="0"/>
-                </a:rPr>
-                <a:t>Tulsiani</a:t>
-              </a:r>
-              <a:r>
-                <a:rPr lang="en-US" sz="2000" dirty="0">
-                  <a:latin typeface="Calibri" pitchFamily="34" charset="0"/>
-                </a:rPr>
-                <a:t> and Malik. </a:t>
-              </a:r>
-              <a:r>
-                <a:rPr lang="en-US" sz="2000" i="1" dirty="0">
-                  <a:latin typeface="Calibri" pitchFamily="34" charset="0"/>
-                </a:rPr>
-                <a:t>Viewpoints and </a:t>
-              </a:r>
-              <a:r>
-                <a:rPr lang="en-US" sz="2000" i="1" dirty="0" err="1">
-                  <a:latin typeface="Calibri" pitchFamily="34" charset="0"/>
-                </a:rPr>
-                <a:t>Keypoints</a:t>
-              </a:r>
-              <a:r>
-                <a:rPr lang="en-US" sz="2000" dirty="0">
-                  <a:latin typeface="Calibri" pitchFamily="34" charset="0"/>
-                </a:rPr>
-                <a:t>. CVPR 2015.</a:t>
+                <a:t> preprint arXiv:1612.03801, 2016. </a:t>
               </a:r>
             </a:p>
           </p:txBody>
@@ -2295,228 +2394,6 @@
       </p:grpSp>
       <p:grpSp>
         <p:nvGrpSpPr>
-          <p:cNvPr id="121" name="Group 120"/>
-          <p:cNvGrpSpPr/>
-          <p:nvPr/>
-        </p:nvGrpSpPr>
-        <p:grpSpPr>
-          <a:xfrm>
-            <a:off x="457200" y="25057101"/>
-            <a:ext cx="10332720" cy="7404098"/>
-            <a:chOff x="274319" y="4350262"/>
-            <a:chExt cx="10332720" cy="7404098"/>
-          </a:xfrm>
-        </p:grpSpPr>
-        <p:sp>
-          <p:nvSpPr>
-            <p:cNvPr id="122" name="Text Box 189"/>
-            <p:cNvSpPr txBox="1">
-              <a:spLocks noChangeArrowheads="1"/>
-            </p:cNvSpPr>
-            <p:nvPr/>
-          </p:nvSpPr>
-          <p:spPr bwMode="auto">
-            <a:xfrm>
-              <a:off x="274319" y="5036061"/>
-              <a:ext cx="10332720" cy="6718299"/>
-            </a:xfrm>
-            <a:prstGeom prst="rect">
-              <a:avLst/>
-            </a:prstGeom>
-            <a:solidFill>
-              <a:schemeClr val="bg1"/>
-            </a:solidFill>
-            <a:ln w="12700">
-              <a:solidFill>
-                <a:schemeClr val="accent1">
-                  <a:lumMod val="75000"/>
-                </a:schemeClr>
-              </a:solidFill>
-            </a:ln>
-            <a:effectLst/>
-          </p:spPr>
-          <p:txBody>
-            <a:bodyPr wrap="square" lIns="137137" tIns="137137" rIns="137137" bIns="137137">
-              <a:noAutofit/>
-            </a:bodyPr>
-            <a:lstStyle>
-              <a:lvl1pPr eaLnBrk="0" hangingPunct="0">
-                <a:defRPr sz="2200">
-                  <a:solidFill>
-                    <a:schemeClr val="tx1"/>
-                  </a:solidFill>
-                  <a:latin typeface="Arial" charset="0"/>
-                </a:defRPr>
-              </a:lvl1pPr>
-              <a:lvl2pPr marL="742950" indent="-285750" eaLnBrk="0" hangingPunct="0">
-                <a:defRPr sz="2200">
-                  <a:solidFill>
-                    <a:schemeClr val="tx1"/>
-                  </a:solidFill>
-                  <a:latin typeface="Arial" charset="0"/>
-                </a:defRPr>
-              </a:lvl2pPr>
-              <a:lvl3pPr marL="1143000" indent="-228600" eaLnBrk="0" hangingPunct="0">
-                <a:defRPr sz="2200">
-                  <a:solidFill>
-                    <a:schemeClr val="tx1"/>
-                  </a:solidFill>
-                  <a:latin typeface="Arial" charset="0"/>
-                </a:defRPr>
-              </a:lvl3pPr>
-              <a:lvl4pPr marL="1600200" indent="-228600" eaLnBrk="0" hangingPunct="0">
-                <a:defRPr sz="2200">
-                  <a:solidFill>
-                    <a:schemeClr val="tx1"/>
-                  </a:solidFill>
-                  <a:latin typeface="Arial" charset="0"/>
-                </a:defRPr>
-              </a:lvl4pPr>
-              <a:lvl5pPr marL="2057400" indent="-228600" eaLnBrk="0" hangingPunct="0">
-                <a:defRPr sz="2200">
-                  <a:solidFill>
-                    <a:schemeClr val="tx1"/>
-                  </a:solidFill>
-                  <a:latin typeface="Arial" charset="0"/>
-                </a:defRPr>
-              </a:lvl5pPr>
-              <a:lvl6pPr marL="2514600" indent="-228600" eaLnBrk="0" fontAlgn="base" hangingPunct="0">
-                <a:spcBef>
-                  <a:spcPct val="0"/>
-                </a:spcBef>
-                <a:spcAft>
-                  <a:spcPct val="0"/>
-                </a:spcAft>
-                <a:defRPr sz="2200">
-                  <a:solidFill>
-                    <a:schemeClr val="tx1"/>
-                  </a:solidFill>
-                  <a:latin typeface="Arial" charset="0"/>
-                </a:defRPr>
-              </a:lvl6pPr>
-              <a:lvl7pPr marL="2971800" indent="-228600" eaLnBrk="0" fontAlgn="base" hangingPunct="0">
-                <a:spcBef>
-                  <a:spcPct val="0"/>
-                </a:spcBef>
-                <a:spcAft>
-                  <a:spcPct val="0"/>
-                </a:spcAft>
-                <a:defRPr sz="2200">
-                  <a:solidFill>
-                    <a:schemeClr val="tx1"/>
-                  </a:solidFill>
-                  <a:latin typeface="Arial" charset="0"/>
-                </a:defRPr>
-              </a:lvl7pPr>
-              <a:lvl8pPr marL="3429000" indent="-228600" eaLnBrk="0" fontAlgn="base" hangingPunct="0">
-                <a:spcBef>
-                  <a:spcPct val="0"/>
-                </a:spcBef>
-                <a:spcAft>
-                  <a:spcPct val="0"/>
-                </a:spcAft>
-                <a:defRPr sz="2200">
-                  <a:solidFill>
-                    <a:schemeClr val="tx1"/>
-                  </a:solidFill>
-                  <a:latin typeface="Arial" charset="0"/>
-                </a:defRPr>
-              </a:lvl8pPr>
-              <a:lvl9pPr marL="3886200" indent="-228600" eaLnBrk="0" fontAlgn="base" hangingPunct="0">
-                <a:spcBef>
-                  <a:spcPct val="0"/>
-                </a:spcBef>
-                <a:spcAft>
-                  <a:spcPct val="0"/>
-                </a:spcAft>
-                <a:defRPr sz="2200">
-                  <a:solidFill>
-                    <a:schemeClr val="tx1"/>
-                  </a:solidFill>
-                  <a:latin typeface="Arial" charset="0"/>
-                </a:defRPr>
-              </a:lvl9pPr>
-            </a:lstStyle>
-            <a:p>
-              <a:pPr eaLnBrk="1" hangingPunct="1">
-                <a:spcAft>
-                  <a:spcPts val="1200"/>
-                </a:spcAft>
-              </a:pPr>
-              <a:endParaRPr lang="en-US" sz="3200" dirty="0">
-                <a:latin typeface="Calibri" pitchFamily="34" charset="0"/>
-              </a:endParaRPr>
-            </a:p>
-          </p:txBody>
-        </p:sp>
-        <p:sp>
-          <p:nvSpPr>
-            <p:cNvPr id="123" name="Rectangle 122"/>
-            <p:cNvSpPr/>
-            <p:nvPr/>
-          </p:nvSpPr>
-          <p:spPr>
-            <a:xfrm>
-              <a:off x="274319" y="4350262"/>
-              <a:ext cx="10332720" cy="685800"/>
-            </a:xfrm>
-            <a:prstGeom prst="rect">
-              <a:avLst/>
-            </a:prstGeom>
-            <a:solidFill>
-              <a:srgbClr val="00274C"/>
-            </a:solidFill>
-            <a:ln w="12700"/>
-          </p:spPr>
-          <p:style>
-            <a:lnRef idx="2">
-              <a:schemeClr val="accent1">
-                <a:shade val="50000"/>
-              </a:schemeClr>
-            </a:lnRef>
-            <a:fillRef idx="1">
-              <a:schemeClr val="accent1"/>
-            </a:fillRef>
-            <a:effectRef idx="0">
-              <a:schemeClr val="accent1"/>
-            </a:effectRef>
-            <a:fontRef idx="minor">
-              <a:schemeClr val="lt1"/>
-            </a:fontRef>
-          </p:style>
-          <p:txBody>
-            <a:bodyPr lIns="68568" tIns="34284" rIns="68568" bIns="34284" rtlCol="0" anchor="ctr"/>
-            <a:lstStyle/>
-            <a:p>
-              <a:pPr algn="ctr"/>
-              <a:r>
-                <a:rPr lang="en-US" sz="4400" b="1" dirty="0" err="1">
-                  <a:solidFill>
-                    <a:schemeClr val="accent3">
-                      <a:lumMod val="20000"/>
-                      <a:lumOff val="80000"/>
-                    </a:schemeClr>
-                  </a:solidFill>
-                </a:rPr>
-                <a:t>Keypoint</a:t>
-              </a:r>
-              <a:r>
-                <a:rPr lang="en-US" sz="4400" b="1" dirty="0">
-                  <a:solidFill>
-                    <a:schemeClr val="accent3">
-                      <a:lumMod val="20000"/>
-                      <a:lumOff val="80000"/>
-                    </a:schemeClr>
-                  </a:solidFill>
-                </a:rPr>
-                <a:t> Collection</a:t>
-              </a:r>
-            </a:p>
-          </p:txBody>
-        </p:sp>
-      </p:grpSp>
-      <p:grpSp>
-        <p:nvGrpSpPr>
           <p:cNvPr id="129" name="Group 128"/>
           <p:cNvGrpSpPr/>
           <p:nvPr/>
@@ -2734,7 +2611,7 @@
         <p:grpSpPr>
           <a:xfrm>
             <a:off x="452022" y="15592401"/>
-            <a:ext cx="10337898" cy="8538133"/>
+            <a:ext cx="10337898" cy="16864526"/>
             <a:chOff x="263751" y="23222446"/>
             <a:chExt cx="10337898" cy="8538133"/>
           </a:xfrm>
@@ -2991,6 +2868,40 @@
                   <a:latin typeface="Calibri"/>
                 </a:rPr>
                 <a:t>in to a single learning framework. </a:t>
+              </a:r>
+            </a:p>
+            <a:p>
+              <a:pPr lvl="0" algn="just" eaLnBrk="1" hangingPunct="1">
+                <a:spcAft>
+                  <a:spcPts val="1200"/>
+                </a:spcAft>
+              </a:pPr>
+              <a:r>
+                <a:rPr lang="en-US" sz="3200" dirty="0">
+                  <a:solidFill>
+                    <a:prstClr val="black"/>
+                  </a:solidFill>
+                  <a:latin typeface="Calibri"/>
+                </a:rPr>
+                <a:t>Agents are trained on pure vision based monocular input. The model utilized is a modified version of the </a:t>
+              </a:r>
+              <a:r>
+                <a:rPr lang="en-US" sz="3200" b="1" dirty="0">
+                  <a:solidFill>
+                    <a:prstClr val="black"/>
+                  </a:solidFill>
+                  <a:latin typeface="Calibri"/>
+                </a:rPr>
+                <a:t>NAV-A3C-D1-D2-L</a:t>
+              </a:r>
+              <a:r>
+                <a:rPr lang="en-US" sz="3200" dirty="0">
+                  <a:solidFill>
+                    <a:prstClr val="black"/>
+                  </a:solidFill>
+                  <a:latin typeface="Calibri"/>
+                </a:rPr>
+                <a:t> architecture.</a:t>
               </a:r>
             </a:p>
           </p:txBody>
@@ -3536,10 +3447,10 @@
         </p:nvGrpSpPr>
         <p:grpSpPr>
           <a:xfrm>
-            <a:off x="11049427" y="22114045"/>
-            <a:ext cx="21810129" cy="10347154"/>
+            <a:off x="11049427" y="22114043"/>
+            <a:ext cx="21810129" cy="10347155"/>
             <a:chOff x="11022273" y="21611267"/>
-            <a:chExt cx="21810129" cy="6945057"/>
+            <a:chExt cx="21810129" cy="6945058"/>
           </a:xfrm>
         </p:grpSpPr>
         <p:sp>
@@ -3606,7 +3517,7 @@
           </p:nvSpPr>
           <p:spPr bwMode="auto">
             <a:xfrm>
-              <a:off x="11022273" y="22079493"/>
+              <a:off x="11022273" y="22079494"/>
               <a:ext cx="21802653" cy="6476831"/>
             </a:xfrm>
             <a:prstGeom prst="rect">
@@ -4431,6 +4342,804 @@
           </p:txBody>
         </p:sp>
       </p:grpSp>
+      <p:pic>
+        <p:nvPicPr>
+          <p:cNvPr id="10" name="Picture 9">
+            <a:extLst>
+              <a:ext uri="{FF2B5EF4-FFF2-40B4-BE49-F238E27FC236}">
+                <a16:creationId xmlns:a16="http://schemas.microsoft.com/office/drawing/2014/main" id="{A0463ED5-07CA-4DE5-BF9F-86B45A9F974C}"/>
+              </a:ext>
+            </a:extLst>
+          </p:cNvPr>
+          <p:cNvPicPr>
+            <a:picLocks noChangeAspect="1"/>
+          </p:cNvPicPr>
+          <p:nvPr/>
+        </p:nvPicPr>
+        <p:blipFill>
+          <a:blip r:embed="rId3"/>
+          <a:stretch>
+            <a:fillRect/>
+          </a:stretch>
+        </p:blipFill>
+        <p:spPr>
+          <a:xfrm>
+            <a:off x="6858000" y="26136600"/>
+            <a:ext cx="2929967" cy="4989931"/>
+          </a:xfrm>
+          <a:prstGeom prst="rect">
+            <a:avLst/>
+          </a:prstGeom>
+        </p:spPr>
+      </p:pic>
+      <mc:AlternateContent xmlns:mc="http://schemas.openxmlformats.org/markup-compatibility/2006">
+        <mc:Choice xmlns:a14="http://schemas.microsoft.com/office/drawing/2010/main" Requires="a14">
+          <p:sp>
+            <p:nvSpPr>
+              <p:cNvPr id="32" name="TextBox 31">
+                <a:extLst>
+                  <a:ext uri="{FF2B5EF4-FFF2-40B4-BE49-F238E27FC236}">
+                    <a16:creationId xmlns:a16="http://schemas.microsoft.com/office/drawing/2014/main" id="{D8F10F9A-BC7B-4635-9438-62242283C200}"/>
+                  </a:ext>
+                </a:extLst>
+              </p:cNvPr>
+              <p:cNvSpPr txBox="1"/>
+              <p:nvPr/>
+            </p:nvSpPr>
+            <p:spPr>
+              <a:xfrm>
+                <a:off x="762000" y="21372175"/>
+                <a:ext cx="5181600" cy="10784225"/>
+              </a:xfrm>
+              <a:prstGeom prst="rect">
+                <a:avLst/>
+              </a:prstGeom>
+              <a:noFill/>
+            </p:spPr>
+            <p:txBody>
+              <a:bodyPr wrap="square" rtlCol="0">
+                <a:noAutofit/>
+              </a:bodyPr>
+              <a:lstStyle/>
+              <a:p>
+                <a:pPr lvl="0">
+                  <a:spcAft>
+                    <a:spcPts val="1200"/>
+                  </a:spcAft>
+                </a:pPr>
+                <a:r>
+                  <a:rPr lang="en-US" sz="3200" dirty="0">
+                    <a:solidFill>
+                      <a:prstClr val="black"/>
+                    </a:solidFill>
+                  </a:rPr>
+                  <a:t>Environment:</a:t>
+                </a:r>
+              </a:p>
+              <a:p>
+                <a:pPr marL="457200" lvl="0" indent="-457200">
+                  <a:spcAft>
+                    <a:spcPts val="1200"/>
+                  </a:spcAft>
+                  <a:buFont typeface="Arial" panose="020B0604020202020204" pitchFamily="34" charset="0"/>
+                  <a:buChar char="•"/>
+                </a:pPr>
+                <a:r>
+                  <a:rPr lang="en-US" sz="3200" dirty="0">
+                    <a:solidFill>
+                      <a:prstClr val="black"/>
+                    </a:solidFill>
+                  </a:rPr>
+                  <a:t>Utilizes </a:t>
+                </a:r>
+                <a:r>
+                  <a:rPr lang="en-US" sz="3200" dirty="0" err="1">
+                    <a:solidFill>
+                      <a:prstClr val="black"/>
+                    </a:solidFill>
+                  </a:rPr>
+                  <a:t>Deepmind</a:t>
+                </a:r>
+                <a:r>
+                  <a:rPr lang="en-US" sz="3200" dirty="0">
+                    <a:solidFill>
+                      <a:prstClr val="black"/>
+                    </a:solidFill>
+                  </a:rPr>
+                  <a:t> Lab [2].</a:t>
+                </a:r>
+              </a:p>
+              <a:p>
+                <a:pPr marL="457200" lvl="0" indent="-457200">
+                  <a:spcAft>
+                    <a:spcPts val="1200"/>
+                  </a:spcAft>
+                  <a:buFont typeface="Arial" panose="020B0604020202020204" pitchFamily="34" charset="0"/>
+                  <a:buChar char="•"/>
+                </a:pPr>
+                <a:r>
+                  <a:rPr lang="en-US" sz="3200" b="1" dirty="0">
+                    <a:solidFill>
+                      <a:prstClr val="black"/>
+                    </a:solidFill>
+                  </a:rPr>
+                  <a:t>Randomly</a:t>
+                </a:r>
+                <a:r>
+                  <a:rPr lang="en-US" sz="3200" dirty="0">
+                    <a:solidFill>
+                      <a:prstClr val="black"/>
+                    </a:solidFill>
+                  </a:rPr>
+                  <a:t> generated environments.</a:t>
+                </a:r>
+              </a:p>
+              <a:p>
+                <a:pPr marL="457200" lvl="0" indent="-457200">
+                  <a:spcAft>
+                    <a:spcPts val="1200"/>
+                  </a:spcAft>
+                  <a:buFont typeface="Arial" panose="020B0604020202020204" pitchFamily="34" charset="0"/>
+                  <a:buChar char="•"/>
+                </a:pPr>
+                <a:r>
+                  <a:rPr lang="en-US" sz="3200" dirty="0">
+                    <a:solidFill>
+                      <a:prstClr val="black"/>
+                    </a:solidFill>
+                  </a:rPr>
+                  <a:t>Agents tasked with learning to repeatedly </a:t>
+                </a:r>
+                <a:r>
+                  <a:rPr lang="en-US" sz="3200">
+                    <a:solidFill>
+                      <a:prstClr val="black"/>
+                    </a:solidFill>
+                  </a:rPr>
+                  <a:t>find the </a:t>
+                </a:r>
+                <a:r>
+                  <a:rPr lang="en-US" sz="3200" dirty="0">
+                    <a:solidFill>
+                      <a:prstClr val="black"/>
+                    </a:solidFill>
+                  </a:rPr>
+                  <a:t>goal to </a:t>
+                </a:r>
+                <a:r>
+                  <a:rPr lang="en-US" sz="3200">
+                    <a:solidFill>
+                      <a:prstClr val="black"/>
+                    </a:solidFill>
+                  </a:rPr>
+                  <a:t>maximize reward.</a:t>
+                </a:r>
+                <a:endParaRPr lang="en-US" sz="3200" dirty="0">
+                  <a:solidFill>
+                    <a:prstClr val="black"/>
+                  </a:solidFill>
+                </a:endParaRPr>
+              </a:p>
+              <a:p>
+                <a:pPr lvl="0">
+                  <a:spcAft>
+                    <a:spcPts val="1200"/>
+                  </a:spcAft>
+                </a:pPr>
+                <a:r>
+                  <a:rPr lang="en-US" sz="3200" dirty="0">
+                    <a:solidFill>
+                      <a:prstClr val="black"/>
+                    </a:solidFill>
+                  </a:rPr>
+                  <a:t>Model Inputs:</a:t>
+                </a:r>
+              </a:p>
+              <a:p>
+                <a:pPr marL="457200" lvl="0" indent="-457200" algn="just">
+                  <a:spcAft>
+                    <a:spcPts val="1200"/>
+                  </a:spcAft>
+                  <a:buFont typeface="Arial" panose="020B0604020202020204" pitchFamily="34" charset="0"/>
+                  <a:buChar char="•"/>
+                </a:pPr>
+                <a14:m>
+                  <m:oMath xmlns:m="http://schemas.openxmlformats.org/officeDocument/2006/math">
+                    <m:sSub>
+                      <m:sSubPr>
+                        <m:ctrlPr>
+                          <a:rPr lang="en-US" sz="3200" i="1">
+                            <a:solidFill>
+                              <a:prstClr val="black"/>
+                            </a:solidFill>
+                            <a:latin typeface="Cambria Math" panose="02040503050406030204" pitchFamily="18" charset="0"/>
+                          </a:rPr>
+                        </m:ctrlPr>
+                      </m:sSubPr>
+                      <m:e>
+                        <m:r>
+                          <a:rPr lang="en-US" sz="3200" i="1">
+                            <a:solidFill>
+                              <a:prstClr val="black"/>
+                            </a:solidFill>
+                            <a:latin typeface="Cambria Math" panose="02040503050406030204" pitchFamily="18" charset="0"/>
+                          </a:rPr>
+                          <m:t>𝐼</m:t>
+                        </m:r>
+                      </m:e>
+                      <m:sub>
+                        <m:r>
+                          <a:rPr lang="en-US" sz="3200" i="1">
+                            <a:solidFill>
+                              <a:prstClr val="black"/>
+                            </a:solidFill>
+                            <a:latin typeface="Cambria Math" panose="02040503050406030204" pitchFamily="18" charset="0"/>
+                          </a:rPr>
+                          <m:t>𝑡</m:t>
+                        </m:r>
+                      </m:sub>
+                    </m:sSub>
+                  </m:oMath>
+                </a14:m>
+                <a:r>
+                  <a:rPr lang="en-US" sz="3200" dirty="0">
+                    <a:solidFill>
+                      <a:prstClr val="black"/>
+                    </a:solidFill>
+                  </a:rPr>
+                  <a:t> - RGB monocular view</a:t>
+                </a:r>
+              </a:p>
+              <a:p>
+                <a:pPr marL="457200" lvl="0" indent="-457200" algn="just">
+                  <a:spcAft>
+                    <a:spcPts val="1200"/>
+                  </a:spcAft>
+                  <a:buFont typeface="Arial" panose="020B0604020202020204" pitchFamily="34" charset="0"/>
+                  <a:buChar char="•"/>
+                </a:pPr>
+                <a14:m>
+                  <m:oMath xmlns:m="http://schemas.openxmlformats.org/officeDocument/2006/math">
+                    <m:sSub>
+                      <m:sSubPr>
+                        <m:ctrlPr>
+                          <a:rPr lang="en-US" sz="3200" i="1">
+                            <a:solidFill>
+                              <a:prstClr val="black"/>
+                            </a:solidFill>
+                            <a:latin typeface="Cambria Math" panose="02040503050406030204" pitchFamily="18" charset="0"/>
+                          </a:rPr>
+                        </m:ctrlPr>
+                      </m:sSubPr>
+                      <m:e>
+                        <m:r>
+                          <a:rPr lang="en-US" sz="3200" i="1">
+                            <a:solidFill>
+                              <a:prstClr val="black"/>
+                            </a:solidFill>
+                            <a:latin typeface="Cambria Math" panose="02040503050406030204" pitchFamily="18" charset="0"/>
+                          </a:rPr>
+                          <m:t>𝑟</m:t>
+                        </m:r>
+                      </m:e>
+                      <m:sub>
+                        <m:r>
+                          <a:rPr lang="en-US" sz="3200" i="1">
+                            <a:solidFill>
+                              <a:prstClr val="black"/>
+                            </a:solidFill>
+                            <a:latin typeface="Cambria Math" panose="02040503050406030204" pitchFamily="18" charset="0"/>
+                          </a:rPr>
+                          <m:t>𝑡</m:t>
+                        </m:r>
+                        <m:r>
+                          <a:rPr lang="en-US" sz="3200" i="1">
+                            <a:solidFill>
+                              <a:prstClr val="black"/>
+                            </a:solidFill>
+                            <a:latin typeface="Cambria Math" panose="02040503050406030204" pitchFamily="18" charset="0"/>
+                          </a:rPr>
+                          <m:t>−1</m:t>
+                        </m:r>
+                      </m:sub>
+                    </m:sSub>
+                  </m:oMath>
+                </a14:m>
+                <a:r>
+                  <a:rPr lang="en-US" sz="3200" dirty="0">
+                    <a:solidFill>
+                      <a:prstClr val="black"/>
+                    </a:solidFill>
+                  </a:rPr>
+                  <a:t> - previous reward</a:t>
+                </a:r>
+              </a:p>
+              <a:p>
+                <a:pPr marL="457200" lvl="0" indent="-457200" algn="just">
+                  <a:spcAft>
+                    <a:spcPts val="1200"/>
+                  </a:spcAft>
+                  <a:buFont typeface="Arial" panose="020B0604020202020204" pitchFamily="34" charset="0"/>
+                  <a:buChar char="•"/>
+                </a:pPr>
+                <a14:m>
+                  <m:oMath xmlns:m="http://schemas.openxmlformats.org/officeDocument/2006/math">
+                    <m:sSub>
+                      <m:sSubPr>
+                        <m:ctrlPr>
+                          <a:rPr lang="en-US" sz="3200" i="1">
+                            <a:solidFill>
+                              <a:prstClr val="black"/>
+                            </a:solidFill>
+                            <a:latin typeface="Cambria Math" panose="02040503050406030204" pitchFamily="18" charset="0"/>
+                          </a:rPr>
+                        </m:ctrlPr>
+                      </m:sSubPr>
+                      <m:e>
+                        <m:r>
+                          <a:rPr lang="en-US" sz="3200" i="1">
+                            <a:solidFill>
+                              <a:prstClr val="black"/>
+                            </a:solidFill>
+                            <a:latin typeface="Cambria Math" panose="02040503050406030204" pitchFamily="18" charset="0"/>
+                          </a:rPr>
+                          <m:t>𝑎</m:t>
+                        </m:r>
+                      </m:e>
+                      <m:sub>
+                        <m:r>
+                          <a:rPr lang="en-US" sz="3200" i="1">
+                            <a:solidFill>
+                              <a:prstClr val="black"/>
+                            </a:solidFill>
+                            <a:latin typeface="Cambria Math" panose="02040503050406030204" pitchFamily="18" charset="0"/>
+                          </a:rPr>
+                          <m:t>𝑡</m:t>
+                        </m:r>
+                        <m:r>
+                          <a:rPr lang="en-US" sz="3200" i="1">
+                            <a:solidFill>
+                              <a:prstClr val="black"/>
+                            </a:solidFill>
+                            <a:latin typeface="Cambria Math" panose="02040503050406030204" pitchFamily="18" charset="0"/>
+                          </a:rPr>
+                          <m:t>−1</m:t>
+                        </m:r>
+                      </m:sub>
+                    </m:sSub>
+                  </m:oMath>
+                </a14:m>
+                <a:r>
+                  <a:rPr lang="en-US" sz="3200" dirty="0">
+                    <a:solidFill>
+                      <a:prstClr val="black"/>
+                    </a:solidFill>
+                  </a:rPr>
+                  <a:t> - previous action</a:t>
+                </a:r>
+              </a:p>
+              <a:p>
+                <a:pPr lvl="0" algn="just">
+                  <a:spcAft>
+                    <a:spcPts val="1200"/>
+                  </a:spcAft>
+                </a:pPr>
+                <a:r>
+                  <a:rPr lang="en-US" sz="3200" dirty="0">
+                    <a:solidFill>
+                      <a:prstClr val="black"/>
+                    </a:solidFill>
+                  </a:rPr>
+                  <a:t>Model Outputs:</a:t>
+                </a:r>
+              </a:p>
+              <a:p>
+                <a:pPr marL="457200" indent="-457200" algn="just">
+                  <a:spcAft>
+                    <a:spcPts val="1200"/>
+                  </a:spcAft>
+                  <a:buFont typeface="Arial" panose="020B0604020202020204" pitchFamily="34" charset="0"/>
+                  <a:buChar char="•"/>
+                </a:pPr>
+                <a14:m>
+                  <m:oMath xmlns:m="http://schemas.openxmlformats.org/officeDocument/2006/math">
+                    <m:sSub>
+                      <m:sSubPr>
+                        <m:ctrlPr>
+                          <a:rPr lang="en-US" sz="3200" i="1">
+                            <a:solidFill>
+                              <a:prstClr val="black"/>
+                            </a:solidFill>
+                            <a:latin typeface="Cambria Math" panose="02040503050406030204" pitchFamily="18" charset="0"/>
+                          </a:rPr>
+                        </m:ctrlPr>
+                      </m:sSubPr>
+                      <m:e>
+                        <m:r>
+                          <m:rPr>
+                            <m:nor/>
+                          </m:rPr>
+                          <a:rPr lang="el-GR" sz="3200"/>
+                          <m:t>π</m:t>
+                        </m:r>
+                      </m:e>
+                      <m:sub>
+                        <m:r>
+                          <a:rPr lang="en-US" sz="3200" i="1">
+                            <a:solidFill>
+                              <a:prstClr val="black"/>
+                            </a:solidFill>
+                            <a:latin typeface="Cambria Math" panose="02040503050406030204" pitchFamily="18" charset="0"/>
+                          </a:rPr>
+                          <m:t>𝑡</m:t>
+                        </m:r>
+                      </m:sub>
+                    </m:sSub>
+                  </m:oMath>
+                </a14:m>
+                <a:r>
+                  <a:rPr lang="en-US" sz="3200" dirty="0">
+                    <a:solidFill>
+                      <a:prstClr val="black"/>
+                    </a:solidFill>
+                  </a:rPr>
+                  <a:t> - policy</a:t>
+                </a:r>
+              </a:p>
+              <a:p>
+                <a:pPr marL="457200" indent="-457200" algn="just">
+                  <a:spcAft>
+                    <a:spcPts val="1200"/>
+                  </a:spcAft>
+                  <a:buFont typeface="Arial" panose="020B0604020202020204" pitchFamily="34" charset="0"/>
+                  <a:buChar char="•"/>
+                </a:pPr>
+                <a14:m>
+                  <m:oMath xmlns:m="http://schemas.openxmlformats.org/officeDocument/2006/math">
+                    <m:sSub>
+                      <m:sSubPr>
+                        <m:ctrlPr>
+                          <a:rPr lang="en-US" sz="3200" i="1">
+                            <a:solidFill>
+                              <a:prstClr val="black"/>
+                            </a:solidFill>
+                            <a:latin typeface="Cambria Math" panose="02040503050406030204" pitchFamily="18" charset="0"/>
+                          </a:rPr>
+                        </m:ctrlPr>
+                      </m:sSubPr>
+                      <m:e>
+                        <m:r>
+                          <a:rPr lang="en-US" sz="3200" i="1">
+                            <a:solidFill>
+                              <a:prstClr val="black"/>
+                            </a:solidFill>
+                            <a:latin typeface="Cambria Math" panose="02040503050406030204" pitchFamily="18" charset="0"/>
+                          </a:rPr>
+                          <m:t>𝑉</m:t>
+                        </m:r>
+                      </m:e>
+                      <m:sub>
+                        <m:r>
+                          <a:rPr lang="en-US" sz="3200" i="1">
+                            <a:solidFill>
+                              <a:prstClr val="black"/>
+                            </a:solidFill>
+                            <a:latin typeface="Cambria Math" panose="02040503050406030204" pitchFamily="18" charset="0"/>
+                          </a:rPr>
+                          <m:t>𝑡</m:t>
+                        </m:r>
+                      </m:sub>
+                    </m:sSub>
+                  </m:oMath>
+                </a14:m>
+                <a:r>
+                  <a:rPr lang="en-US" sz="3200" dirty="0">
+                    <a:solidFill>
+                      <a:prstClr val="black"/>
+                    </a:solidFill>
+                  </a:rPr>
+                  <a:t> - value function</a:t>
+                </a:r>
+              </a:p>
+              <a:p>
+                <a:pPr marL="457200" indent="-457200" algn="just">
+                  <a:spcAft>
+                    <a:spcPts val="1200"/>
+                  </a:spcAft>
+                  <a:buFont typeface="Arial" panose="020B0604020202020204" pitchFamily="34" charset="0"/>
+                  <a:buChar char="•"/>
+                </a:pPr>
+                <a:r>
+                  <a:rPr lang="en-US" sz="3200" dirty="0">
+                    <a:solidFill>
+                      <a:prstClr val="black"/>
+                    </a:solidFill>
+                  </a:rPr>
+                  <a:t>L -   loop closure signal</a:t>
+                </a:r>
+              </a:p>
+              <a:p>
+                <a:pPr marL="457200" indent="-457200" algn="just">
+                  <a:spcAft>
+                    <a:spcPts val="1200"/>
+                  </a:spcAft>
+                  <a:buFont typeface="Arial" panose="020B0604020202020204" pitchFamily="34" charset="0"/>
+                  <a:buChar char="•"/>
+                </a:pPr>
+                <a14:m>
+                  <m:oMath xmlns:m="http://schemas.openxmlformats.org/officeDocument/2006/math">
+                    <m:sSub>
+                      <m:sSubPr>
+                        <m:ctrlPr>
+                          <a:rPr lang="en-US" sz="3200" i="1">
+                            <a:solidFill>
+                              <a:prstClr val="black"/>
+                            </a:solidFill>
+                            <a:latin typeface="Cambria Math" panose="02040503050406030204" pitchFamily="18" charset="0"/>
+                          </a:rPr>
+                        </m:ctrlPr>
+                      </m:sSubPr>
+                      <m:e>
+                        <m:r>
+                          <a:rPr lang="en-US" sz="3200" i="1">
+                            <a:solidFill>
+                              <a:prstClr val="black"/>
+                            </a:solidFill>
+                            <a:latin typeface="Cambria Math" panose="02040503050406030204" pitchFamily="18" charset="0"/>
+                          </a:rPr>
+                          <m:t>𝐷</m:t>
+                        </m:r>
+                      </m:e>
+                      <m:sub>
+                        <m:r>
+                          <a:rPr lang="en-US" sz="3200" i="1">
+                            <a:solidFill>
+                              <a:prstClr val="black"/>
+                            </a:solidFill>
+                            <a:latin typeface="Cambria Math" panose="02040503050406030204" pitchFamily="18" charset="0"/>
+                          </a:rPr>
+                          <m:t>1</m:t>
+                        </m:r>
+                      </m:sub>
+                    </m:sSub>
+                    <m:r>
+                      <a:rPr lang="en-US" sz="3200" i="1">
+                        <a:solidFill>
+                          <a:prstClr val="black"/>
+                        </a:solidFill>
+                        <a:latin typeface="Cambria Math" panose="02040503050406030204" pitchFamily="18" charset="0"/>
+                      </a:rPr>
+                      <m:t>,</m:t>
+                    </m:r>
+                    <m:sSub>
+                      <m:sSubPr>
+                        <m:ctrlPr>
+                          <a:rPr lang="en-US" sz="3200" i="1">
+                            <a:solidFill>
+                              <a:prstClr val="black"/>
+                            </a:solidFill>
+                            <a:latin typeface="Cambria Math" panose="02040503050406030204" pitchFamily="18" charset="0"/>
+                          </a:rPr>
+                        </m:ctrlPr>
+                      </m:sSubPr>
+                      <m:e>
+                        <m:r>
+                          <a:rPr lang="en-US" sz="3200" i="1">
+                            <a:solidFill>
+                              <a:prstClr val="black"/>
+                            </a:solidFill>
+                            <a:latin typeface="Cambria Math" panose="02040503050406030204" pitchFamily="18" charset="0"/>
+                          </a:rPr>
+                          <m:t>𝐷</m:t>
+                        </m:r>
+                      </m:e>
+                      <m:sub>
+                        <m:r>
+                          <a:rPr lang="en-US" sz="3200" i="1">
+                            <a:solidFill>
+                              <a:prstClr val="black"/>
+                            </a:solidFill>
+                            <a:latin typeface="Cambria Math" panose="02040503050406030204" pitchFamily="18" charset="0"/>
+                          </a:rPr>
+                          <m:t>2</m:t>
+                        </m:r>
+                      </m:sub>
+                    </m:sSub>
+                  </m:oMath>
+                </a14:m>
+                <a:r>
+                  <a:rPr lang="en-US" sz="3200" dirty="0">
+                    <a:solidFill>
+                      <a:prstClr val="black"/>
+                    </a:solidFill>
+                  </a:rPr>
+                  <a:t> - depth prediction</a:t>
+                </a:r>
+              </a:p>
+              <a:p>
+                <a:pPr>
+                  <a:spcAft>
+                    <a:spcPts val="1200"/>
+                  </a:spcAft>
+                </a:pPr>
+                <a:endParaRPr lang="en-US" sz="3200" dirty="0"/>
+              </a:p>
+            </p:txBody>
+          </p:sp>
+        </mc:Choice>
+        <mc:Fallback>
+          <p:sp>
+            <p:nvSpPr>
+              <p:cNvPr id="32" name="TextBox 31">
+                <a:extLst>
+                  <a:ext uri="{FF2B5EF4-FFF2-40B4-BE49-F238E27FC236}">
+                    <a16:creationId xmlns:a16="http://schemas.microsoft.com/office/drawing/2014/main" id="{D8F10F9A-BC7B-4635-9438-62242283C200}"/>
+                  </a:ext>
+                </a:extLst>
+              </p:cNvPr>
+              <p:cNvSpPr txBox="1">
+                <a:spLocks noRot="1" noChangeAspect="1" noMove="1" noResize="1" noEditPoints="1" noAdjustHandles="1" noChangeArrowheads="1" noChangeShapeType="1" noTextEdit="1"/>
+              </p:cNvSpPr>
+              <p:nvPr/>
+            </p:nvSpPr>
+            <p:spPr>
+              <a:xfrm>
+                <a:off x="762000" y="21372175"/>
+                <a:ext cx="5181600" cy="10784225"/>
+              </a:xfrm>
+              <a:prstGeom prst="rect">
+                <a:avLst/>
+              </a:prstGeom>
+              <a:blipFill>
+                <a:blip r:embed="rId4"/>
+                <a:stretch>
+                  <a:fillRect l="-2941" t="-735" r="-1765"/>
+                </a:stretch>
+              </a:blipFill>
+            </p:spPr>
+            <p:txBody>
+              <a:bodyPr/>
+              <a:lstStyle/>
+              <a:p>
+                <a:r>
+                  <a:rPr lang="en-US">
+                    <a:noFill/>
+                  </a:rPr>
+                  <a:t> </a:t>
+                </a:r>
+              </a:p>
+            </p:txBody>
+          </p:sp>
+        </mc:Fallback>
+      </mc:AlternateContent>
+      <p:pic>
+        <p:nvPicPr>
+          <p:cNvPr id="41" name="Picture 40">
+            <a:extLst>
+              <a:ext uri="{FF2B5EF4-FFF2-40B4-BE49-F238E27FC236}">
+                <a16:creationId xmlns:a16="http://schemas.microsoft.com/office/drawing/2014/main" id="{EE8D656A-187F-402A-BE88-9D36DC50795E}"/>
+              </a:ext>
+            </a:extLst>
+          </p:cNvPr>
+          <p:cNvPicPr>
+            <a:picLocks noChangeAspect="1"/>
+          </p:cNvPicPr>
+          <p:nvPr/>
+        </p:nvPicPr>
+        <p:blipFill>
+          <a:blip r:embed="rId5"/>
+          <a:stretch>
+            <a:fillRect/>
+          </a:stretch>
+        </p:blipFill>
+        <p:spPr>
+          <a:xfrm>
+            <a:off x="6420087" y="21045512"/>
+            <a:ext cx="4145904" cy="4139574"/>
+          </a:xfrm>
+          <a:prstGeom prst="rect">
+            <a:avLst/>
+          </a:prstGeom>
+        </p:spPr>
+      </p:pic>
+      <p:sp>
+        <p:nvSpPr>
+          <p:cNvPr id="46" name="TextBox 45">
+            <a:extLst>
+              <a:ext uri="{FF2B5EF4-FFF2-40B4-BE49-F238E27FC236}">
+                <a16:creationId xmlns:a16="http://schemas.microsoft.com/office/drawing/2014/main" id="{46AF9689-F1A0-4581-9BC0-3E1BCFF27763}"/>
+              </a:ext>
+            </a:extLst>
+          </p:cNvPr>
+          <p:cNvSpPr txBox="1"/>
+          <p:nvPr/>
+        </p:nvSpPr>
+        <p:spPr>
+          <a:xfrm>
+            <a:off x="6667499" y="25302276"/>
+            <a:ext cx="3539567" cy="610394"/>
+          </a:xfrm>
+          <a:prstGeom prst="rect">
+            <a:avLst/>
+          </a:prstGeom>
+          <a:noFill/>
+        </p:spPr>
+        <p:txBody>
+          <a:bodyPr wrap="square" rtlCol="0">
+            <a:noAutofit/>
+          </a:bodyPr>
+          <a:lstStyle/>
+          <a:p>
+            <a:pPr algn="ctr">
+              <a:spcAft>
+                <a:spcPts val="1200"/>
+              </a:spcAft>
+            </a:pPr>
+            <a:r>
+              <a:rPr lang="en-US" sz="2000" b="1" dirty="0"/>
+              <a:t>Fig 1. </a:t>
+            </a:r>
+            <a:r>
+              <a:rPr lang="en-US" sz="2000" dirty="0"/>
+              <a:t>Screen shots from </a:t>
+            </a:r>
+            <a:r>
+              <a:rPr lang="en-US" sz="2000" dirty="0" err="1"/>
+              <a:t>Deepmind</a:t>
+            </a:r>
+            <a:r>
+              <a:rPr lang="en-US" sz="2000" dirty="0"/>
+              <a:t> lab environment.</a:t>
+            </a:r>
+            <a:endParaRPr lang="en-US" sz="2000" b="1" dirty="0"/>
+          </a:p>
+        </p:txBody>
+      </p:sp>
+      <p:sp>
+        <p:nvSpPr>
+          <p:cNvPr id="127" name="TextBox 126">
+            <a:extLst>
+              <a:ext uri="{FF2B5EF4-FFF2-40B4-BE49-F238E27FC236}">
+                <a16:creationId xmlns:a16="http://schemas.microsoft.com/office/drawing/2014/main" id="{DEED9FDF-FCB5-4FC8-9721-E4E36BFEB4AA}"/>
+              </a:ext>
+            </a:extLst>
+          </p:cNvPr>
+          <p:cNvSpPr txBox="1"/>
+          <p:nvPr/>
+        </p:nvSpPr>
+        <p:spPr>
+          <a:xfrm>
+            <a:off x="6591299" y="31271276"/>
+            <a:ext cx="3539567" cy="732724"/>
+          </a:xfrm>
+          <a:prstGeom prst="rect">
+            <a:avLst/>
+          </a:prstGeom>
+          <a:noFill/>
+        </p:spPr>
+        <p:txBody>
+          <a:bodyPr wrap="square" rtlCol="0">
+            <a:noAutofit/>
+          </a:bodyPr>
+          <a:lstStyle/>
+          <a:p>
+            <a:pPr algn="ctr">
+              <a:spcAft>
+                <a:spcPts val="1200"/>
+              </a:spcAft>
+            </a:pPr>
+            <a:r>
+              <a:rPr lang="en-US" sz="2000" b="1" dirty="0"/>
+              <a:t>Fig 2. </a:t>
+            </a:r>
+            <a:r>
+              <a:rPr lang="en-US" sz="2000" dirty="0"/>
+              <a:t>Modified Nav-A3c-D1-D2-l architecture.</a:t>
+            </a:r>
+            <a:endParaRPr lang="en-US" sz="2000" b="1" dirty="0"/>
+          </a:p>
+        </p:txBody>
+      </p:sp>
     </p:spTree>
     <p:extLst>
       <p:ext uri="{BB962C8B-B14F-4D97-AF65-F5344CB8AC3E}">

</xml_diff>

<commit_message>
More about the setup. Introducing metrics. Will get back to it in a bit. Feel free to edit.
</commit_message>
<xml_diff>
--- a/gennav-poster/BaDhGrICLR2018-poster.pptx
+++ b/gennav-poster/BaDhGrICLR2018-poster.pptx
@@ -1835,7 +1835,18 @@
                 <a:rPr lang="en-US" sz="3200" b="1" dirty="0">
                   <a:latin typeface="Calibri" pitchFamily="34" charset="0"/>
                 </a:rPr>
-                <a:t> (2016) state-of-the-art deep reinforcement learning method for navigation across a wide variety of environments and starting conditions and discover that learned navigational abilities do not generalize to previously unseen environments.</a:t>
+                <a:t> (2016) </a:t>
+              </a:r>
+              <a:br>
+                <a:rPr lang="en-US" sz="3200" b="1" dirty="0">
+                  <a:latin typeface="Calibri" pitchFamily="34" charset="0"/>
+                </a:rPr>
+              </a:br>
+              <a:r>
+                <a:rPr lang="en-US" sz="3200" b="1" dirty="0">
+                  <a:latin typeface="Calibri" pitchFamily="34" charset="0"/>
+                </a:rPr>
+                <a:t>NAV-A3C-D1-D2-L deep reinforcement learning method for navigation across a wide variety of environments and starting conditions and discover that learned navigational abilities do not generalize to previously unseen environments.</a:t>
               </a:r>
             </a:p>
             <a:p>
@@ -2915,10 +2926,10 @@
         </p:nvGrpSpPr>
         <p:grpSpPr>
           <a:xfrm>
-            <a:off x="11049000" y="13194630"/>
-            <a:ext cx="21808440" cy="5296253"/>
-            <a:chOff x="11023962" y="13224006"/>
-            <a:chExt cx="21826626" cy="5296253"/>
+            <a:off x="11049427" y="14410625"/>
+            <a:ext cx="21808440" cy="7292967"/>
+            <a:chOff x="11023962" y="13224004"/>
+            <a:chExt cx="21826626" cy="5296255"/>
           </a:xfrm>
         </p:grpSpPr>
         <p:grpSp>
@@ -2929,8 +2940,8 @@
           </p:nvGrpSpPr>
           <p:grpSpPr>
             <a:xfrm>
-              <a:off x="11023962" y="13224006"/>
-              <a:ext cx="21808440" cy="5296253"/>
+              <a:off x="11023962" y="13224004"/>
+              <a:ext cx="21808440" cy="5296252"/>
               <a:chOff x="11023962" y="11934496"/>
               <a:chExt cx="21808440" cy="6642436"/>
             </a:xfrm>
@@ -3067,7 +3078,7 @@
               </a:lstStyle>
               <a:p>
                 <a:pPr eaLnBrk="1" hangingPunct="1"/>
-                <a:endParaRPr lang="en-US" sz="3200" b="1" dirty="0">
+                <a:endParaRPr lang="en-US" sz="3200" dirty="0">
                   <a:latin typeface="Calibri" pitchFamily="34" charset="0"/>
                 </a:endParaRPr>
               </a:p>
@@ -3122,7 +3133,7 @@
                       </a:schemeClr>
                     </a:solidFill>
                   </a:rPr>
-                  <a:t>Training Data</a:t>
+                  <a:t>Evaluation Metrics</a:t>
                 </a:r>
               </a:p>
             </p:txBody>
@@ -3137,7 +3148,7 @@
           <p:spPr>
             <a:xfrm>
               <a:off x="11041379" y="14020800"/>
-              <a:ext cx="10868618" cy="533400"/>
+              <a:ext cx="10868618" cy="739741"/>
             </a:xfrm>
             <a:prstGeom prst="rect">
               <a:avLst/>
@@ -3157,7 +3168,7 @@
               </a:pPr>
               <a:r>
                 <a:rPr lang="en-US" sz="3200" b="1" dirty="0"/>
-                <a:t>Synthetic Data</a:t>
+                <a:t>Latency 1:&gt;1</a:t>
               </a:r>
             </a:p>
           </p:txBody>
@@ -3191,7 +3202,7 @@
               </a:pPr>
               <a:r>
                 <a:rPr lang="en-US" sz="3200" b="1" dirty="0"/>
-                <a:t>PASCAL 3D+ Data</a:t>
+                <a:t>Distance Inefficiency</a:t>
               </a:r>
             </a:p>
           </p:txBody>
@@ -3228,216 +3239,6 @@
             </a:fontRef>
           </p:style>
         </p:cxnSp>
-      </p:grpSp>
-      <p:grpSp>
-        <p:nvGrpSpPr>
-          <p:cNvPr id="124" name="Group 123"/>
-          <p:cNvGrpSpPr/>
-          <p:nvPr/>
-        </p:nvGrpSpPr>
-        <p:grpSpPr>
-          <a:xfrm>
-            <a:off x="11045952" y="18816573"/>
-            <a:ext cx="21808440" cy="2971783"/>
-            <a:chOff x="11023962" y="11934497"/>
-            <a:chExt cx="21808440" cy="3727141"/>
-          </a:xfrm>
-        </p:grpSpPr>
-        <p:sp>
-          <p:nvSpPr>
-            <p:cNvPr id="125" name="Text Box 192"/>
-            <p:cNvSpPr txBox="1">
-              <a:spLocks noChangeArrowheads="1"/>
-            </p:cNvSpPr>
-            <p:nvPr/>
-          </p:nvSpPr>
-          <p:spPr bwMode="auto">
-            <a:xfrm>
-              <a:off x="11023962" y="12794610"/>
-              <a:ext cx="21808440" cy="2867028"/>
-            </a:xfrm>
-            <a:prstGeom prst="rect">
-              <a:avLst/>
-            </a:prstGeom>
-            <a:solidFill>
-              <a:schemeClr val="bg1"/>
-            </a:solidFill>
-            <a:ln w="12700">
-              <a:solidFill>
-                <a:schemeClr val="accent1">
-                  <a:lumMod val="75000"/>
-                </a:schemeClr>
-              </a:solidFill>
-            </a:ln>
-            <a:effectLst/>
-          </p:spPr>
-          <p:txBody>
-            <a:bodyPr lIns="137137" tIns="137137" rIns="137137" bIns="137137">
-              <a:noAutofit/>
-            </a:bodyPr>
-            <a:lstStyle>
-              <a:lvl1pPr eaLnBrk="0" hangingPunct="0">
-                <a:defRPr sz="2200">
-                  <a:solidFill>
-                    <a:schemeClr val="tx1"/>
-                  </a:solidFill>
-                  <a:latin typeface="Arial" charset="0"/>
-                </a:defRPr>
-              </a:lvl1pPr>
-              <a:lvl2pPr marL="742950" indent="-285750" eaLnBrk="0" hangingPunct="0">
-                <a:defRPr sz="2200">
-                  <a:solidFill>
-                    <a:schemeClr val="tx1"/>
-                  </a:solidFill>
-                  <a:latin typeface="Arial" charset="0"/>
-                </a:defRPr>
-              </a:lvl2pPr>
-              <a:lvl3pPr marL="1143000" indent="-228600" eaLnBrk="0" hangingPunct="0">
-                <a:defRPr sz="2200">
-                  <a:solidFill>
-                    <a:schemeClr val="tx1"/>
-                  </a:solidFill>
-                  <a:latin typeface="Arial" charset="0"/>
-                </a:defRPr>
-              </a:lvl3pPr>
-              <a:lvl4pPr marL="1600200" indent="-228600" eaLnBrk="0" hangingPunct="0">
-                <a:defRPr sz="2200">
-                  <a:solidFill>
-                    <a:schemeClr val="tx1"/>
-                  </a:solidFill>
-                  <a:latin typeface="Arial" charset="0"/>
-                </a:defRPr>
-              </a:lvl4pPr>
-              <a:lvl5pPr marL="2057400" indent="-228600" eaLnBrk="0" hangingPunct="0">
-                <a:defRPr sz="2200">
-                  <a:solidFill>
-                    <a:schemeClr val="tx1"/>
-                  </a:solidFill>
-                  <a:latin typeface="Arial" charset="0"/>
-                </a:defRPr>
-              </a:lvl5pPr>
-              <a:lvl6pPr marL="2514600" indent="-228600" eaLnBrk="0" fontAlgn="base" hangingPunct="0">
-                <a:spcBef>
-                  <a:spcPct val="0"/>
-                </a:spcBef>
-                <a:spcAft>
-                  <a:spcPct val="0"/>
-                </a:spcAft>
-                <a:defRPr sz="2200">
-                  <a:solidFill>
-                    <a:schemeClr val="tx1"/>
-                  </a:solidFill>
-                  <a:latin typeface="Arial" charset="0"/>
-                </a:defRPr>
-              </a:lvl6pPr>
-              <a:lvl7pPr marL="2971800" indent="-228600" eaLnBrk="0" fontAlgn="base" hangingPunct="0">
-                <a:spcBef>
-                  <a:spcPct val="0"/>
-                </a:spcBef>
-                <a:spcAft>
-                  <a:spcPct val="0"/>
-                </a:spcAft>
-                <a:defRPr sz="2200">
-                  <a:solidFill>
-                    <a:schemeClr val="tx1"/>
-                  </a:solidFill>
-                  <a:latin typeface="Arial" charset="0"/>
-                </a:defRPr>
-              </a:lvl7pPr>
-              <a:lvl8pPr marL="3429000" indent="-228600" eaLnBrk="0" fontAlgn="base" hangingPunct="0">
-                <a:spcBef>
-                  <a:spcPct val="0"/>
-                </a:spcBef>
-                <a:spcAft>
-                  <a:spcPct val="0"/>
-                </a:spcAft>
-                <a:defRPr sz="2200">
-                  <a:solidFill>
-                    <a:schemeClr val="tx1"/>
-                  </a:solidFill>
-                  <a:latin typeface="Arial" charset="0"/>
-                </a:defRPr>
-              </a:lvl8pPr>
-              <a:lvl9pPr marL="3886200" indent="-228600" eaLnBrk="0" fontAlgn="base" hangingPunct="0">
-                <a:spcBef>
-                  <a:spcPct val="0"/>
-                </a:spcBef>
-                <a:spcAft>
-                  <a:spcPct val="0"/>
-                </a:spcAft>
-                <a:defRPr sz="2200">
-                  <a:solidFill>
-                    <a:schemeClr val="tx1"/>
-                  </a:solidFill>
-                  <a:latin typeface="Arial" charset="0"/>
-                </a:defRPr>
-              </a:lvl9pPr>
-            </a:lstStyle>
-            <a:p>
-              <a:pPr marL="514350" indent="-514350" eaLnBrk="1" hangingPunct="1">
-                <a:buFont typeface="+mj-lt"/>
-                <a:buAutoNum type="arabicPeriod"/>
-              </a:pPr>
-              <a:endParaRPr lang="en-US" sz="3200" dirty="0">
-                <a:latin typeface="Calibri" pitchFamily="34" charset="0"/>
-              </a:endParaRPr>
-            </a:p>
-          </p:txBody>
-        </p:sp>
-        <p:sp>
-          <p:nvSpPr>
-            <p:cNvPr id="126" name="Rectangle 125"/>
-            <p:cNvSpPr/>
-            <p:nvPr/>
-          </p:nvSpPr>
-          <p:spPr>
-            <a:xfrm>
-              <a:off x="11023962" y="11934497"/>
-              <a:ext cx="21808440" cy="860114"/>
-            </a:xfrm>
-            <a:prstGeom prst="rect">
-              <a:avLst/>
-            </a:prstGeom>
-            <a:solidFill>
-              <a:srgbClr val="00274C"/>
-            </a:solidFill>
-            <a:ln w="12700"/>
-          </p:spPr>
-          <p:style>
-            <a:lnRef idx="2">
-              <a:schemeClr val="accent1">
-                <a:shade val="50000"/>
-              </a:schemeClr>
-            </a:lnRef>
-            <a:fillRef idx="1">
-              <a:schemeClr val="accent1"/>
-            </a:fillRef>
-            <a:effectRef idx="0">
-              <a:schemeClr val="accent1"/>
-            </a:effectRef>
-            <a:fontRef idx="minor">
-              <a:schemeClr val="lt1"/>
-            </a:fontRef>
-          </p:style>
-          <p:txBody>
-            <a:bodyPr lIns="68568" tIns="34284" rIns="68568" bIns="34284" rtlCol="0" anchor="ctr"/>
-            <a:lstStyle/>
-            <a:p>
-              <a:pPr algn="ctr"/>
-              <a:r>
-                <a:rPr lang="en-US" sz="4400" b="1" dirty="0">
-                  <a:solidFill>
-                    <a:schemeClr val="accent3">
-                      <a:lumMod val="20000"/>
-                      <a:lumOff val="80000"/>
-                    </a:schemeClr>
-                  </a:solidFill>
-                </a:rPr>
-                <a:t>Training Procedure</a:t>
-              </a:r>
-            </a:p>
-          </p:txBody>
-        </p:sp>
       </p:grpSp>
       <p:grpSp>
         <p:nvGrpSpPr>
@@ -4143,8 +3944,8 @@
         </p:nvGrpSpPr>
         <p:grpSpPr>
           <a:xfrm>
-            <a:off x="11042503" y="4572000"/>
-            <a:ext cx="21808440" cy="8296940"/>
+            <a:off x="11042503" y="4571999"/>
+            <a:ext cx="21808440" cy="9750466"/>
             <a:chOff x="11042503" y="4572000"/>
             <a:chExt cx="21808440" cy="8296940"/>
           </a:xfrm>
@@ -4281,9 +4082,12 @@
             </a:lstStyle>
             <a:p>
               <a:pPr eaLnBrk="1" hangingPunct="1"/>
-              <a:endParaRPr lang="en-US" sz="3200" dirty="0">
-                <a:latin typeface="Calibri" pitchFamily="34" charset="0"/>
-              </a:endParaRPr>
+              <a:r>
+                <a:rPr lang="en-US" sz="3200" dirty="0">
+                  <a:latin typeface="Calibri" pitchFamily="34" charset="0"/>
+                </a:rPr>
+                <a:t>We randomly generate 1000 training maps and 100 testing maps for our experiments.</a:t>
+              </a:r>
             </a:p>
           </p:txBody>
         </p:sp>
@@ -4336,7 +4140,7 @@
                     </a:schemeClr>
                   </a:solidFill>
                 </a:rPr>
-                <a:t>Click-Here CNN (CH-CNN)</a:t>
+                <a:t>The DRL Navigation Challenge</a:t>
               </a:r>
             </a:p>
           </p:txBody>
@@ -4488,37 +4292,8 @@
                       <a:prstClr val="black"/>
                     </a:solidFill>
                   </a:rPr>
-                  <a:t>Agents tasked with learning to repeatedly </a:t>
+                  <a:t>Agents tasked with learning to repeatedly find the goal to maximize reward.</a:t>
                 </a:r>
-                <a:r>
-                  <a:rPr lang="en-US" sz="3200">
-                    <a:solidFill>
-                      <a:prstClr val="black"/>
-                    </a:solidFill>
-                  </a:rPr>
-                  <a:t>find the </a:t>
-                </a:r>
-                <a:r>
-                  <a:rPr lang="en-US" sz="3200" dirty="0">
-                    <a:solidFill>
-                      <a:prstClr val="black"/>
-                    </a:solidFill>
-                  </a:rPr>
-                  <a:t>goal to </a:t>
-                </a:r>
-                <a:r>
-                  <a:rPr lang="en-US" sz="3200">
-                    <a:solidFill>
-                      <a:prstClr val="black"/>
-                    </a:solidFill>
-                  </a:rPr>
-                  <a:t>maximize reward.</a:t>
-                </a:r>
-                <a:endParaRPr lang="en-US" sz="3200" dirty="0">
-                  <a:solidFill>
-                    <a:prstClr val="black"/>
-                  </a:solidFill>
-                </a:endParaRPr>
               </a:p>
               <a:p>
                 <a:pPr lvl="0">
@@ -5140,6 +4915,692 @@
           </a:p>
         </p:txBody>
       </p:sp>
+      <p:sp>
+        <p:nvSpPr>
+          <p:cNvPr id="111" name="TextBox 110">
+            <a:extLst>
+              <a:ext uri="{FF2B5EF4-FFF2-40B4-BE49-F238E27FC236}">
+                <a16:creationId xmlns:a16="http://schemas.microsoft.com/office/drawing/2014/main" id="{E38D5F9D-66F5-421C-9F9B-F68C28394AD7}"/>
+              </a:ext>
+            </a:extLst>
+          </p:cNvPr>
+          <p:cNvSpPr txBox="1"/>
+          <p:nvPr/>
+        </p:nvSpPr>
+        <p:spPr>
+          <a:xfrm>
+            <a:off x="11277600" y="6220285"/>
+            <a:ext cx="10820400" cy="7691729"/>
+          </a:xfrm>
+          <a:prstGeom prst="rect">
+            <a:avLst/>
+          </a:prstGeom>
+          <a:noFill/>
+        </p:spPr>
+        <p:txBody>
+          <a:bodyPr wrap="square" rtlCol="0">
+            <a:noAutofit/>
+          </a:bodyPr>
+          <a:lstStyle/>
+          <a:p>
+            <a:pPr algn="ctr"/>
+            <a:r>
+              <a:rPr lang="en-US" sz="3200" b="1" dirty="0">
+                <a:latin typeface="Calibri" pitchFamily="34" charset="0"/>
+              </a:rPr>
+              <a:t>Coincident Training/Testing Sets (Static Maps)</a:t>
+            </a:r>
+            <a:r>
+              <a:rPr lang="en-US" sz="3200" dirty="0">
+                <a:latin typeface="Calibri" pitchFamily="34" charset="0"/>
+              </a:rPr>
+              <a:t>:</a:t>
+            </a:r>
+          </a:p>
+          <a:p>
+            <a:pPr marL="457200" indent="-457200">
+              <a:buFont typeface="Arial" panose="020B0604020202020204" pitchFamily="34" charset="0"/>
+              <a:buChar char="•"/>
+            </a:pPr>
+            <a:r>
+              <a:rPr lang="en-US" sz="3200" dirty="0">
+                <a:latin typeface="Calibri" pitchFamily="34" charset="0"/>
+              </a:rPr>
+              <a:t>10 maps are randomly selected from the training set.</a:t>
+            </a:r>
+          </a:p>
+          <a:p>
+            <a:pPr marL="457200" indent="-457200">
+              <a:buFont typeface="Arial" panose="020B0604020202020204" pitchFamily="34" charset="0"/>
+              <a:buChar char="•"/>
+            </a:pPr>
+            <a:r>
+              <a:rPr lang="en-US" sz="3200" dirty="0">
+                <a:latin typeface="Calibri" pitchFamily="34" charset="0"/>
+              </a:rPr>
+              <a:t>Agents are trained and tested on the same map under differing starting conditions:</a:t>
+            </a:r>
+            <a:br>
+              <a:rPr lang="en-US" sz="3200" dirty="0">
+                <a:latin typeface="Calibri" pitchFamily="34" charset="0"/>
+              </a:rPr>
+            </a:br>
+            <a:endParaRPr lang="en-US" sz="3200" dirty="0">
+              <a:latin typeface="Calibri" pitchFamily="34" charset="0"/>
+            </a:endParaRPr>
+          </a:p>
+          <a:p>
+            <a:pPr marL="798513" lvl="1" indent="-342900" algn="just">
+              <a:spcAft>
+                <a:spcPts val="1200"/>
+              </a:spcAft>
+              <a:buFont typeface="Arial" panose="020B0604020202020204" pitchFamily="34" charset="0"/>
+              <a:buChar char="•"/>
+            </a:pPr>
+            <a:r>
+              <a:rPr lang="en-US" sz="3200" i="1" dirty="0">
+                <a:latin typeface="Calibri" pitchFamily="34" charset="0"/>
+              </a:rPr>
+              <a:t>static goal, static spawn</a:t>
+            </a:r>
+          </a:p>
+          <a:p>
+            <a:pPr marL="798513" lvl="1" indent="-342900" algn="just">
+              <a:spcAft>
+                <a:spcPts val="1200"/>
+              </a:spcAft>
+              <a:buFont typeface="Arial" panose="020B0604020202020204" pitchFamily="34" charset="0"/>
+              <a:buChar char="•"/>
+            </a:pPr>
+            <a:r>
+              <a:rPr lang="en-US" sz="3200" i="1" dirty="0">
+                <a:latin typeface="Calibri" pitchFamily="34" charset="0"/>
+              </a:rPr>
+              <a:t>static goal, random spawn</a:t>
+            </a:r>
+          </a:p>
+          <a:p>
+            <a:pPr marL="798513" lvl="1" indent="-342900" algn="just">
+              <a:spcAft>
+                <a:spcPts val="1200"/>
+              </a:spcAft>
+              <a:buFont typeface="Arial" panose="020B0604020202020204" pitchFamily="34" charset="0"/>
+              <a:buChar char="•"/>
+            </a:pPr>
+            <a:endParaRPr lang="en-US" sz="3200" i="1" dirty="0">
+              <a:latin typeface="Calibri" pitchFamily="34" charset="0"/>
+            </a:endParaRPr>
+          </a:p>
+          <a:p>
+            <a:pPr marL="798513" lvl="1" indent="-342900" algn="just">
+              <a:spcAft>
+                <a:spcPts val="1200"/>
+              </a:spcAft>
+              <a:buFont typeface="Arial" panose="020B0604020202020204" pitchFamily="34" charset="0"/>
+              <a:buChar char="•"/>
+            </a:pPr>
+            <a:endParaRPr lang="en-US" sz="3200" i="1" dirty="0">
+              <a:latin typeface="Calibri" pitchFamily="34" charset="0"/>
+            </a:endParaRPr>
+          </a:p>
+          <a:p>
+            <a:pPr marL="798513" lvl="1" indent="-342900" algn="just">
+              <a:spcAft>
+                <a:spcPts val="1200"/>
+              </a:spcAft>
+              <a:buFont typeface="Arial" panose="020B0604020202020204" pitchFamily="34" charset="0"/>
+              <a:buChar char="•"/>
+            </a:pPr>
+            <a:endParaRPr lang="en-US" sz="3200" i="1" dirty="0">
+              <a:latin typeface="Calibri" pitchFamily="34" charset="0"/>
+            </a:endParaRPr>
+          </a:p>
+          <a:p>
+            <a:pPr marL="455613" lvl="1" algn="just">
+              <a:spcAft>
+                <a:spcPts val="1200"/>
+              </a:spcAft>
+            </a:pPr>
+            <a:br>
+              <a:rPr lang="en-US" sz="3200" i="1" dirty="0">
+                <a:latin typeface="Calibri" pitchFamily="34" charset="0"/>
+              </a:rPr>
+            </a:br>
+            <a:endParaRPr lang="en-US" sz="3200" i="1" dirty="0">
+              <a:latin typeface="Calibri" pitchFamily="34" charset="0"/>
+            </a:endParaRPr>
+          </a:p>
+          <a:p>
+            <a:pPr marL="457200" indent="-457200">
+              <a:buFont typeface="Arial" panose="020B0604020202020204" pitchFamily="34" charset="0"/>
+              <a:buChar char="•"/>
+            </a:pPr>
+            <a:r>
+              <a:rPr lang="en-US" sz="3200" dirty="0">
+                <a:latin typeface="Calibri" pitchFamily="34" charset="0"/>
+              </a:rPr>
+              <a:t>The experiments analyze how well agent’s can remember and </a:t>
+            </a:r>
+            <a:r>
+              <a:rPr lang="en-US" sz="3200" b="1" dirty="0">
+                <a:latin typeface="Calibri" pitchFamily="34" charset="0"/>
+              </a:rPr>
+              <a:t>exploit</a:t>
+            </a:r>
+            <a:r>
+              <a:rPr lang="en-US" sz="3200" dirty="0">
+                <a:latin typeface="Calibri" pitchFamily="34" charset="0"/>
+              </a:rPr>
+              <a:t> goal location information in explored  environments</a:t>
+            </a:r>
+          </a:p>
+        </p:txBody>
+      </p:sp>
+      <p:sp>
+        <p:nvSpPr>
+          <p:cNvPr id="142" name="TextBox 141">
+            <a:extLst>
+              <a:ext uri="{FF2B5EF4-FFF2-40B4-BE49-F238E27FC236}">
+                <a16:creationId xmlns:a16="http://schemas.microsoft.com/office/drawing/2014/main" id="{E0A3C39C-204C-41DF-B541-3C397B8EA9BD}"/>
+              </a:ext>
+            </a:extLst>
+          </p:cNvPr>
+          <p:cNvSpPr txBox="1"/>
+          <p:nvPr/>
+        </p:nvSpPr>
+        <p:spPr>
+          <a:xfrm>
+            <a:off x="22118026" y="6220286"/>
+            <a:ext cx="10636690" cy="7968194"/>
+          </a:xfrm>
+          <a:prstGeom prst="rect">
+            <a:avLst/>
+          </a:prstGeom>
+          <a:noFill/>
+        </p:spPr>
+        <p:txBody>
+          <a:bodyPr wrap="square" rtlCol="0">
+            <a:noAutofit/>
+          </a:bodyPr>
+          <a:lstStyle/>
+          <a:p>
+            <a:pPr algn="ctr"/>
+            <a:r>
+              <a:rPr lang="en-US" sz="3200" b="1" dirty="0">
+                <a:latin typeface="Calibri" pitchFamily="34" charset="0"/>
+              </a:rPr>
+              <a:t>Separated Training/Testing Sets (Random Maps)</a:t>
+            </a:r>
+            <a:r>
+              <a:rPr lang="en-US" sz="3200" dirty="0">
+                <a:latin typeface="Calibri" pitchFamily="34" charset="0"/>
+              </a:rPr>
+              <a:t>:</a:t>
+            </a:r>
+          </a:p>
+          <a:p>
+            <a:pPr marL="457200" indent="-457200">
+              <a:buFont typeface="Arial" panose="020B0604020202020204" pitchFamily="34" charset="0"/>
+              <a:buChar char="•"/>
+            </a:pPr>
+            <a:r>
+              <a:rPr lang="en-US" sz="3200" dirty="0">
+                <a:latin typeface="Calibri" pitchFamily="34" charset="0"/>
+              </a:rPr>
+              <a:t>Agents are trained on increasing subsets {1, 10, 100, 500, 1000} of the training set and tested on the testing set.</a:t>
+            </a:r>
+          </a:p>
+          <a:p>
+            <a:endParaRPr lang="en-US" sz="3200" dirty="0"/>
+          </a:p>
+          <a:p>
+            <a:endParaRPr lang="en-US" sz="3200" dirty="0"/>
+          </a:p>
+          <a:p>
+            <a:endParaRPr lang="en-US" sz="3200" dirty="0"/>
+          </a:p>
+          <a:p>
+            <a:endParaRPr lang="en-US" sz="3200" dirty="0"/>
+          </a:p>
+          <a:p>
+            <a:endParaRPr lang="en-US" sz="3200" dirty="0"/>
+          </a:p>
+          <a:p>
+            <a:endParaRPr lang="en-US" sz="3200" dirty="0"/>
+          </a:p>
+          <a:p>
+            <a:endParaRPr lang="en-US" sz="3200" dirty="0"/>
+          </a:p>
+          <a:p>
+            <a:endParaRPr lang="en-US" sz="3200" dirty="0"/>
+          </a:p>
+          <a:p>
+            <a:endParaRPr lang="en-US" sz="3200" dirty="0"/>
+          </a:p>
+          <a:p>
+            <a:br>
+              <a:rPr lang="en-US" sz="3200" dirty="0"/>
+            </a:br>
+            <a:endParaRPr lang="en-US" sz="3200" dirty="0"/>
+          </a:p>
+          <a:p>
+            <a:pPr marL="457200" indent="-457200">
+              <a:buFont typeface="Arial" panose="020B0604020202020204" pitchFamily="34" charset="0"/>
+              <a:buChar char="•"/>
+            </a:pPr>
+            <a:r>
+              <a:rPr lang="en-US" sz="3200" dirty="0">
+                <a:latin typeface="Calibri" pitchFamily="34" charset="0"/>
+              </a:rPr>
+              <a:t>The experiments analyze whether these learned navigational abilities extend to unknown environments.</a:t>
+            </a:r>
+            <a:endParaRPr lang="en-US" sz="3200" dirty="0"/>
+          </a:p>
+        </p:txBody>
+      </p:sp>
+      <p:cxnSp>
+        <p:nvCxnSpPr>
+          <p:cNvPr id="150" name="Straight Connector 149">
+            <a:extLst>
+              <a:ext uri="{FF2B5EF4-FFF2-40B4-BE49-F238E27FC236}">
+                <a16:creationId xmlns:a16="http://schemas.microsoft.com/office/drawing/2014/main" id="{024B3A28-928C-49F5-A207-FCB743857423}"/>
+              </a:ext>
+            </a:extLst>
+          </p:cNvPr>
+          <p:cNvCxnSpPr>
+            <a:cxnSpLocks/>
+          </p:cNvCxnSpPr>
+          <p:nvPr/>
+        </p:nvCxnSpPr>
+        <p:spPr>
+          <a:xfrm>
+            <a:off x="22062809" y="6208493"/>
+            <a:ext cx="55217" cy="7968195"/>
+          </a:xfrm>
+          <a:prstGeom prst="line">
+            <a:avLst/>
+          </a:prstGeom>
+        </p:spPr>
+        <p:style>
+          <a:lnRef idx="1">
+            <a:schemeClr val="accent1"/>
+          </a:lnRef>
+          <a:fillRef idx="0">
+            <a:schemeClr val="accent1"/>
+          </a:fillRef>
+          <a:effectRef idx="0">
+            <a:schemeClr val="accent1"/>
+          </a:effectRef>
+          <a:fontRef idx="minor">
+            <a:schemeClr val="tx1"/>
+          </a:fontRef>
+        </p:style>
+      </p:cxnSp>
+      <p:pic>
+        <p:nvPicPr>
+          <p:cNvPr id="118" name="Picture 117">
+            <a:extLst>
+              <a:ext uri="{FF2B5EF4-FFF2-40B4-BE49-F238E27FC236}">
+                <a16:creationId xmlns:a16="http://schemas.microsoft.com/office/drawing/2014/main" id="{B0BB96EA-1561-4136-BDAC-5B1FC95C4023}"/>
+              </a:ext>
+            </a:extLst>
+          </p:cNvPr>
+          <p:cNvPicPr>
+            <a:picLocks noChangeAspect="1"/>
+          </p:cNvPicPr>
+          <p:nvPr/>
+        </p:nvPicPr>
+        <p:blipFill>
+          <a:blip r:embed="rId6"/>
+          <a:stretch>
+            <a:fillRect/>
+          </a:stretch>
+        </p:blipFill>
+        <p:spPr>
+          <a:xfrm>
+            <a:off x="11271526" y="10653423"/>
+            <a:ext cx="10753422" cy="1287498"/>
+          </a:xfrm>
+          <a:prstGeom prst="rect">
+            <a:avLst/>
+          </a:prstGeom>
+        </p:spPr>
+      </p:pic>
+      <p:sp>
+        <p:nvSpPr>
+          <p:cNvPr id="153" name="TextBox 152">
+            <a:extLst>
+              <a:ext uri="{FF2B5EF4-FFF2-40B4-BE49-F238E27FC236}">
+                <a16:creationId xmlns:a16="http://schemas.microsoft.com/office/drawing/2014/main" id="{6F6DC6A5-5058-406E-A0ED-06D75B14BADB}"/>
+              </a:ext>
+            </a:extLst>
+          </p:cNvPr>
+          <p:cNvSpPr txBox="1"/>
+          <p:nvPr/>
+        </p:nvSpPr>
+        <p:spPr>
+          <a:xfrm>
+            <a:off x="12854258" y="12082943"/>
+            <a:ext cx="7552767" cy="480155"/>
+          </a:xfrm>
+          <a:prstGeom prst="rect">
+            <a:avLst/>
+          </a:prstGeom>
+          <a:noFill/>
+        </p:spPr>
+        <p:txBody>
+          <a:bodyPr wrap="square" rtlCol="0">
+            <a:noAutofit/>
+          </a:bodyPr>
+          <a:lstStyle/>
+          <a:p>
+            <a:pPr algn="ctr">
+              <a:spcAft>
+                <a:spcPts val="1200"/>
+              </a:spcAft>
+            </a:pPr>
+            <a:r>
+              <a:rPr lang="en-US" sz="2000" b="1" dirty="0"/>
+              <a:t>Fig 3. </a:t>
+            </a:r>
+            <a:r>
+              <a:rPr lang="en-US" sz="2000" dirty="0"/>
+              <a:t>The 10 randomly selected maps from the training set.</a:t>
+            </a:r>
+            <a:endParaRPr lang="en-US" sz="2000" b="1" dirty="0"/>
+          </a:p>
+        </p:txBody>
+      </p:sp>
+      <p:sp>
+        <p:nvSpPr>
+          <p:cNvPr id="152" name="TextBox 151">
+            <a:extLst>
+              <a:ext uri="{FF2B5EF4-FFF2-40B4-BE49-F238E27FC236}">
+                <a16:creationId xmlns:a16="http://schemas.microsoft.com/office/drawing/2014/main" id="{5946B8F8-0AFA-4D8F-B66B-7501465A4B90}"/>
+              </a:ext>
+            </a:extLst>
+          </p:cNvPr>
+          <p:cNvSpPr txBox="1"/>
+          <p:nvPr/>
+        </p:nvSpPr>
+        <p:spPr>
+          <a:xfrm>
+            <a:off x="16204492" y="8670600"/>
+            <a:ext cx="6019800" cy="1499308"/>
+          </a:xfrm>
+          <a:prstGeom prst="rect">
+            <a:avLst/>
+          </a:prstGeom>
+          <a:noFill/>
+        </p:spPr>
+        <p:txBody>
+          <a:bodyPr wrap="square" rtlCol="0">
+            <a:noAutofit/>
+          </a:bodyPr>
+          <a:lstStyle/>
+          <a:p>
+            <a:pPr marL="798513" lvl="1" indent="-342900" algn="just">
+              <a:spcAft>
+                <a:spcPts val="1200"/>
+              </a:spcAft>
+              <a:buFont typeface="Arial" panose="020B0604020202020204" pitchFamily="34" charset="0"/>
+              <a:buChar char="•"/>
+            </a:pPr>
+            <a:r>
+              <a:rPr lang="en-US" sz="3200" i="1" dirty="0">
+                <a:latin typeface="Calibri" pitchFamily="34" charset="0"/>
+              </a:rPr>
+              <a:t>random goal, static spawn</a:t>
+            </a:r>
+            <a:endParaRPr lang="en-US" sz="3200" dirty="0">
+              <a:latin typeface="Calibri" pitchFamily="34" charset="0"/>
+            </a:endParaRPr>
+          </a:p>
+          <a:p>
+            <a:pPr marL="798513" lvl="1" indent="-342900" algn="just">
+              <a:spcAft>
+                <a:spcPts val="1200"/>
+              </a:spcAft>
+              <a:buFont typeface="Arial" panose="020B0604020202020204" pitchFamily="34" charset="0"/>
+              <a:buChar char="•"/>
+            </a:pPr>
+            <a:r>
+              <a:rPr lang="en-US" sz="3200" i="1" dirty="0">
+                <a:latin typeface="Calibri" pitchFamily="34" charset="0"/>
+              </a:rPr>
+              <a:t>random goal, random spawn</a:t>
+            </a:r>
+            <a:endParaRPr lang="en-US" sz="3200" dirty="0">
+              <a:latin typeface="Calibri" pitchFamily="34" charset="0"/>
+            </a:endParaRPr>
+          </a:p>
+          <a:p>
+            <a:pPr>
+              <a:spcAft>
+                <a:spcPts val="1200"/>
+              </a:spcAft>
+            </a:pPr>
+            <a:endParaRPr lang="en-US" sz="3200" dirty="0"/>
+          </a:p>
+        </p:txBody>
+      </p:sp>
+      <p:pic>
+        <p:nvPicPr>
+          <p:cNvPr id="154" name="Picture 153">
+            <a:extLst>
+              <a:ext uri="{FF2B5EF4-FFF2-40B4-BE49-F238E27FC236}">
+                <a16:creationId xmlns:a16="http://schemas.microsoft.com/office/drawing/2014/main" id="{CCCC3DDC-7305-4249-BB4A-121D63CA34BF}"/>
+              </a:ext>
+            </a:extLst>
+          </p:cNvPr>
+          <p:cNvPicPr>
+            <a:picLocks noChangeAspect="1"/>
+          </p:cNvPicPr>
+          <p:nvPr/>
+        </p:nvPicPr>
+        <p:blipFill>
+          <a:blip r:embed="rId7"/>
+          <a:stretch>
+            <a:fillRect/>
+          </a:stretch>
+        </p:blipFill>
+        <p:spPr>
+          <a:xfrm>
+            <a:off x="23767342" y="7709833"/>
+            <a:ext cx="6515100" cy="3714750"/>
+          </a:xfrm>
+          <a:prstGeom prst="rect">
+            <a:avLst/>
+          </a:prstGeom>
+        </p:spPr>
+      </p:pic>
+      <p:sp>
+        <p:nvSpPr>
+          <p:cNvPr id="156" name="TextBox 155">
+            <a:extLst>
+              <a:ext uri="{FF2B5EF4-FFF2-40B4-BE49-F238E27FC236}">
+                <a16:creationId xmlns:a16="http://schemas.microsoft.com/office/drawing/2014/main" id="{B82CC5E5-9DD0-46B9-9FBF-0BB49CA42F36}"/>
+              </a:ext>
+            </a:extLst>
+          </p:cNvPr>
+          <p:cNvSpPr txBox="1"/>
+          <p:nvPr/>
+        </p:nvSpPr>
+        <p:spPr>
+          <a:xfrm>
+            <a:off x="22396009" y="11360266"/>
+            <a:ext cx="10238224" cy="1420546"/>
+          </a:xfrm>
+          <a:prstGeom prst="rect">
+            <a:avLst/>
+          </a:prstGeom>
+          <a:noFill/>
+        </p:spPr>
+        <p:txBody>
+          <a:bodyPr wrap="square" rtlCol="0">
+            <a:noAutofit/>
+          </a:bodyPr>
+          <a:lstStyle/>
+          <a:p>
+            <a:pPr algn="ctr">
+              <a:spcAft>
+                <a:spcPts val="1200"/>
+              </a:spcAft>
+            </a:pPr>
+            <a:r>
+              <a:rPr lang="en-US" sz="2000" b="1" dirty="0"/>
+              <a:t>Fig 4. </a:t>
+            </a:r>
+            <a:r>
+              <a:rPr lang="en-US" sz="2000" dirty="0"/>
+              <a:t>Reward  curves of the different agents on the testing set. There is a marked increase in reward  when the number of training maps is increased from 10 to 100 but not for 500 or 1000 implying that the learned navigation strategy is learned with enough variation within the first 100 maps and additional information does not benefit the model.</a:t>
+            </a:r>
+            <a:endParaRPr lang="en-US" sz="2000" b="1" dirty="0"/>
+          </a:p>
+        </p:txBody>
+      </p:sp>
+      <mc:AlternateContent xmlns:mc="http://schemas.openxmlformats.org/markup-compatibility/2006">
+        <mc:Choice xmlns:a14="http://schemas.microsoft.com/office/drawing/2010/main" Requires="a14">
+          <p:sp>
+            <p:nvSpPr>
+              <p:cNvPr id="159" name="TextBox 158">
+                <a:extLst>
+                  <a:ext uri="{FF2B5EF4-FFF2-40B4-BE49-F238E27FC236}">
+                    <a16:creationId xmlns:a16="http://schemas.microsoft.com/office/drawing/2014/main" id="{4BFE2BA5-C8F1-4858-A4A0-C9B9CAFC5215}"/>
+                  </a:ext>
+                </a:extLst>
+              </p:cNvPr>
+              <p:cNvSpPr txBox="1"/>
+              <p:nvPr/>
+            </p:nvSpPr>
+            <p:spPr>
+              <a:xfrm>
+                <a:off x="11271526" y="16374059"/>
+                <a:ext cx="10846500" cy="5329533"/>
+              </a:xfrm>
+              <a:prstGeom prst="rect">
+                <a:avLst/>
+              </a:prstGeom>
+              <a:noFill/>
+            </p:spPr>
+            <p:txBody>
+              <a:bodyPr wrap="square" rtlCol="0">
+                <a:noAutofit/>
+              </a:bodyPr>
+              <a:lstStyle/>
+              <a:p>
+                <a:pPr algn="ctr">
+                  <a:spcAft>
+                    <a:spcPts val="1200"/>
+                  </a:spcAft>
+                </a:pPr>
+                <a:r>
+                  <a:rPr lang="en-US" sz="3200" dirty="0"/>
+                  <a:t>Definition: </a:t>
+                </a:r>
+                <a14:m>
+                  <m:oMath xmlns:m="http://schemas.openxmlformats.org/officeDocument/2006/math">
+                    <m:f>
+                      <m:fPr>
+                        <m:ctrlPr>
+                          <a:rPr lang="en-US" sz="3200" i="1" smtClean="0">
+                            <a:latin typeface="Cambria Math" panose="02040503050406030204" pitchFamily="18" charset="0"/>
+                          </a:rPr>
+                        </m:ctrlPr>
+                      </m:fPr>
+                      <m:num>
+                        <m:r>
+                          <a:rPr lang="en-US" sz="3200" b="0" i="1" smtClean="0">
+                            <a:latin typeface="Cambria Math" panose="02040503050406030204" pitchFamily="18" charset="0"/>
+                          </a:rPr>
+                          <m:t>𝑒𝑥𝑝𝑙𝑜𝑟𝑎𝑡𝑖𝑜𝑛</m:t>
+                        </m:r>
+                        <m:r>
+                          <a:rPr lang="en-US" sz="3200" b="0" i="1" smtClean="0">
+                            <a:latin typeface="Cambria Math" panose="02040503050406030204" pitchFamily="18" charset="0"/>
+                          </a:rPr>
+                          <m:t> </m:t>
+                        </m:r>
+                        <m:r>
+                          <a:rPr lang="en-US" sz="3200" b="0" i="1" smtClean="0">
+                            <a:latin typeface="Cambria Math" panose="02040503050406030204" pitchFamily="18" charset="0"/>
+                          </a:rPr>
+                          <m:t>𝑡𝑖𝑚𝑒</m:t>
+                        </m:r>
+                      </m:num>
+                      <m:den>
+                        <m:r>
+                          <a:rPr lang="en-US" sz="3200" b="0" i="1" smtClean="0">
+                            <a:latin typeface="Cambria Math" panose="02040503050406030204" pitchFamily="18" charset="0"/>
+                          </a:rPr>
+                          <m:t>𝑒𝑥𝑝𝑙𝑜𝑖𝑡𝑎𝑡𝑖𝑜𝑛</m:t>
+                        </m:r>
+                        <m:r>
+                          <a:rPr lang="en-US" sz="3200" b="0" i="1" smtClean="0">
+                            <a:latin typeface="Cambria Math" panose="02040503050406030204" pitchFamily="18" charset="0"/>
+                          </a:rPr>
+                          <m:t> </m:t>
+                        </m:r>
+                        <m:r>
+                          <a:rPr lang="en-US" sz="3200" b="0" i="1" smtClean="0">
+                            <a:latin typeface="Cambria Math" panose="02040503050406030204" pitchFamily="18" charset="0"/>
+                          </a:rPr>
+                          <m:t>𝑡𝑖𝑚𝑒</m:t>
+                        </m:r>
+                      </m:den>
+                    </m:f>
+                  </m:oMath>
+                </a14:m>
+                <a:endParaRPr lang="en-US" sz="3200" dirty="0"/>
+              </a:p>
+            </p:txBody>
+          </p:sp>
+        </mc:Choice>
+        <mc:Fallback>
+          <p:sp>
+            <p:nvSpPr>
+              <p:cNvPr id="159" name="TextBox 158">
+                <a:extLst>
+                  <a:ext uri="{FF2B5EF4-FFF2-40B4-BE49-F238E27FC236}">
+                    <a16:creationId xmlns:a16="http://schemas.microsoft.com/office/drawing/2014/main" id="{4BFE2BA5-C8F1-4858-A4A0-C9B9CAFC5215}"/>
+                  </a:ext>
+                </a:extLst>
+              </p:cNvPr>
+              <p:cNvSpPr txBox="1">
+                <a:spLocks noRot="1" noChangeAspect="1" noMove="1" noResize="1" noEditPoints="1" noAdjustHandles="1" noChangeArrowheads="1" noChangeShapeType="1" noTextEdit="1"/>
+              </p:cNvSpPr>
+              <p:nvPr/>
+            </p:nvSpPr>
+            <p:spPr>
+              <a:xfrm>
+                <a:off x="11271526" y="16374059"/>
+                <a:ext cx="10846500" cy="5329533"/>
+              </a:xfrm>
+              <a:prstGeom prst="rect">
+                <a:avLst/>
+              </a:prstGeom>
+              <a:blipFill>
+                <a:blip r:embed="rId8"/>
+                <a:stretch>
+                  <a:fillRect/>
+                </a:stretch>
+              </a:blipFill>
+            </p:spPr>
+            <p:txBody>
+              <a:bodyPr/>
+              <a:lstStyle/>
+              <a:p>
+                <a:r>
+                  <a:rPr lang="en-US">
+                    <a:noFill/>
+                  </a:rPr>
+                  <a:t> </a:t>
+                </a:r>
+              </a:p>
+            </p:txBody>
+          </p:sp>
+        </mc:Fallback>
+      </mc:AlternateContent>
     </p:spTree>
     <p:extLst>
       <p:ext uri="{BB962C8B-B14F-4D97-AF65-F5344CB8AC3E}">

</xml_diff>